<commit_message>
Update Multiplayer web games.pptx
</commit_message>
<xml_diff>
--- a/Presentation/Multiplayer web games.pptx
+++ b/Presentation/Multiplayer web games.pptx
@@ -4,13 +4,29 @@
   <p:sldMasterIdLst>
     <p:sldMasterId id="2147483648" r:id="rId1"/>
   </p:sldMasterIdLst>
+  <p:notesMasterIdLst>
+    <p:notesMasterId r:id="rId21"/>
+  </p:notesMasterIdLst>
   <p:sldIdLst>
     <p:sldId id="256" r:id="rId2"/>
     <p:sldId id="257" r:id="rId3"/>
     <p:sldId id="258" r:id="rId4"/>
     <p:sldId id="259" r:id="rId5"/>
-    <p:sldId id="260" r:id="rId6"/>
-    <p:sldId id="261" r:id="rId7"/>
+    <p:sldId id="264" r:id="rId6"/>
+    <p:sldId id="271" r:id="rId7"/>
+    <p:sldId id="272" r:id="rId8"/>
+    <p:sldId id="273" r:id="rId9"/>
+    <p:sldId id="274" r:id="rId10"/>
+    <p:sldId id="267" r:id="rId11"/>
+    <p:sldId id="265" r:id="rId12"/>
+    <p:sldId id="266" r:id="rId13"/>
+    <p:sldId id="268" r:id="rId14"/>
+    <p:sldId id="269" r:id="rId15"/>
+    <p:sldId id="270" r:id="rId16"/>
+    <p:sldId id="262" r:id="rId17"/>
+    <p:sldId id="260" r:id="rId18"/>
+    <p:sldId id="261" r:id="rId19"/>
+    <p:sldId id="263" r:id="rId20"/>
   </p:sldIdLst>
   <p:sldSz cx="12192000" cy="6858000"/>
   <p:notesSz cx="6858000" cy="9144000"/>
@@ -110,6 +126,456 @@
     </a:lvl9pPr>
   </p:defaultTextStyle>
 </p:presentation>
+</file>
+
+<file path=ppt/notesMasters/notesMaster1.xml><?xml version="1.0" encoding="utf-8"?>
+<p:notesMaster xmlns:a="http://schemas.openxmlformats.org/drawingml/2006/main" xmlns:r="http://schemas.openxmlformats.org/officeDocument/2006/relationships" xmlns:p="http://schemas.openxmlformats.org/presentationml/2006/main">
+  <p:cSld>
+    <p:bg>
+      <p:bgRef idx="1001">
+        <a:schemeClr val="bg1"/>
+      </p:bgRef>
+    </p:bg>
+    <p:spTree>
+      <p:nvGrpSpPr>
+        <p:cNvPr id="1" name=""/>
+        <p:cNvGrpSpPr/>
+        <p:nvPr/>
+      </p:nvGrpSpPr>
+      <p:grpSpPr>
+        <a:xfrm>
+          <a:off x="0" y="0"/>
+          <a:ext cx="0" cy="0"/>
+          <a:chOff x="0" y="0"/>
+          <a:chExt cx="0" cy="0"/>
+        </a:xfrm>
+      </p:grpSpPr>
+      <p:sp>
+        <p:nvSpPr>
+          <p:cNvPr id="2" name="Header Placeholder 1"/>
+          <p:cNvSpPr>
+            <a:spLocks noGrp="1"/>
+          </p:cNvSpPr>
+          <p:nvPr>
+            <p:ph type="hdr" sz="quarter"/>
+          </p:nvPr>
+        </p:nvSpPr>
+        <p:spPr>
+          <a:xfrm>
+            <a:off x="0" y="0"/>
+            <a:ext cx="2971800" cy="458788"/>
+          </a:xfrm>
+          <a:prstGeom prst="rect">
+            <a:avLst/>
+          </a:prstGeom>
+        </p:spPr>
+        <p:txBody>
+          <a:bodyPr vert="horz" lIns="91440" tIns="45720" rIns="91440" bIns="45720" rtlCol="0"/>
+          <a:lstStyle>
+            <a:lvl1pPr algn="l">
+              <a:defRPr sz="1200"/>
+            </a:lvl1pPr>
+          </a:lstStyle>
+          <a:p>
+            <a:endParaRPr lang="en-GB"/>
+          </a:p>
+        </p:txBody>
+      </p:sp>
+      <p:sp>
+        <p:nvSpPr>
+          <p:cNvPr id="3" name="Date Placeholder 2"/>
+          <p:cNvSpPr>
+            <a:spLocks noGrp="1"/>
+          </p:cNvSpPr>
+          <p:nvPr>
+            <p:ph type="dt" idx="1"/>
+          </p:nvPr>
+        </p:nvSpPr>
+        <p:spPr>
+          <a:xfrm>
+            <a:off x="3884613" y="0"/>
+            <a:ext cx="2971800" cy="458788"/>
+          </a:xfrm>
+          <a:prstGeom prst="rect">
+            <a:avLst/>
+          </a:prstGeom>
+        </p:spPr>
+        <p:txBody>
+          <a:bodyPr vert="horz" lIns="91440" tIns="45720" rIns="91440" bIns="45720" rtlCol="0"/>
+          <a:lstStyle>
+            <a:lvl1pPr algn="r">
+              <a:defRPr sz="1200"/>
+            </a:lvl1pPr>
+          </a:lstStyle>
+          <a:p>
+            <a:fld id="{ED8B1562-0651-4676-B15B-D2DD06CB8BF8}" type="datetimeFigureOut">
+              <a:rPr lang="en-GB" smtClean="0"/>
+              <a:t>01/12/2024</a:t>
+            </a:fld>
+            <a:endParaRPr lang="en-GB"/>
+          </a:p>
+        </p:txBody>
+      </p:sp>
+      <p:sp>
+        <p:nvSpPr>
+          <p:cNvPr id="4" name="Slide Image Placeholder 3"/>
+          <p:cNvSpPr>
+            <a:spLocks noGrp="1" noRot="1" noChangeAspect="1"/>
+          </p:cNvSpPr>
+          <p:nvPr>
+            <p:ph type="sldImg" idx="2"/>
+          </p:nvPr>
+        </p:nvSpPr>
+        <p:spPr>
+          <a:xfrm>
+            <a:off x="685800" y="1143000"/>
+            <a:ext cx="5486400" cy="3086100"/>
+          </a:xfrm>
+          <a:prstGeom prst="rect">
+            <a:avLst/>
+          </a:prstGeom>
+          <a:noFill/>
+          <a:ln w="12700">
+            <a:solidFill>
+              <a:prstClr val="black"/>
+            </a:solidFill>
+          </a:ln>
+        </p:spPr>
+        <p:txBody>
+          <a:bodyPr vert="horz" lIns="91440" tIns="45720" rIns="91440" bIns="45720" rtlCol="0" anchor="ctr"/>
+          <a:lstStyle/>
+          <a:p>
+            <a:endParaRPr lang="en-GB"/>
+          </a:p>
+        </p:txBody>
+      </p:sp>
+      <p:sp>
+        <p:nvSpPr>
+          <p:cNvPr id="5" name="Notes Placeholder 4"/>
+          <p:cNvSpPr>
+            <a:spLocks noGrp="1"/>
+          </p:cNvSpPr>
+          <p:nvPr>
+            <p:ph type="body" sz="quarter" idx="3"/>
+          </p:nvPr>
+        </p:nvSpPr>
+        <p:spPr>
+          <a:xfrm>
+            <a:off x="685800" y="4400550"/>
+            <a:ext cx="5486400" cy="3600450"/>
+          </a:xfrm>
+          <a:prstGeom prst="rect">
+            <a:avLst/>
+          </a:prstGeom>
+        </p:spPr>
+        <p:txBody>
+          <a:bodyPr vert="horz" lIns="91440" tIns="45720" rIns="91440" bIns="45720" rtlCol="0"/>
+          <a:lstStyle/>
+          <a:p>
+            <a:pPr lvl="0"/>
+            <a:r>
+              <a:rPr lang="en-US"/>
+              <a:t>Click to edit Master text styles</a:t>
+            </a:r>
+          </a:p>
+          <a:p>
+            <a:pPr lvl="1"/>
+            <a:r>
+              <a:rPr lang="en-US"/>
+              <a:t>Second level</a:t>
+            </a:r>
+          </a:p>
+          <a:p>
+            <a:pPr lvl="2"/>
+            <a:r>
+              <a:rPr lang="en-US"/>
+              <a:t>Third level</a:t>
+            </a:r>
+          </a:p>
+          <a:p>
+            <a:pPr lvl="3"/>
+            <a:r>
+              <a:rPr lang="en-US"/>
+              <a:t>Fourth level</a:t>
+            </a:r>
+          </a:p>
+          <a:p>
+            <a:pPr lvl="4"/>
+            <a:r>
+              <a:rPr lang="en-US"/>
+              <a:t>Fifth level</a:t>
+            </a:r>
+            <a:endParaRPr lang="en-GB"/>
+          </a:p>
+        </p:txBody>
+      </p:sp>
+      <p:sp>
+        <p:nvSpPr>
+          <p:cNvPr id="6" name="Footer Placeholder 5"/>
+          <p:cNvSpPr>
+            <a:spLocks noGrp="1"/>
+          </p:cNvSpPr>
+          <p:nvPr>
+            <p:ph type="ftr" sz="quarter" idx="4"/>
+          </p:nvPr>
+        </p:nvSpPr>
+        <p:spPr>
+          <a:xfrm>
+            <a:off x="0" y="8685213"/>
+            <a:ext cx="2971800" cy="458787"/>
+          </a:xfrm>
+          <a:prstGeom prst="rect">
+            <a:avLst/>
+          </a:prstGeom>
+        </p:spPr>
+        <p:txBody>
+          <a:bodyPr vert="horz" lIns="91440" tIns="45720" rIns="91440" bIns="45720" rtlCol="0" anchor="b"/>
+          <a:lstStyle>
+            <a:lvl1pPr algn="l">
+              <a:defRPr sz="1200"/>
+            </a:lvl1pPr>
+          </a:lstStyle>
+          <a:p>
+            <a:endParaRPr lang="en-GB"/>
+          </a:p>
+        </p:txBody>
+      </p:sp>
+      <p:sp>
+        <p:nvSpPr>
+          <p:cNvPr id="7" name="Slide Number Placeholder 6"/>
+          <p:cNvSpPr>
+            <a:spLocks noGrp="1"/>
+          </p:cNvSpPr>
+          <p:nvPr>
+            <p:ph type="sldNum" sz="quarter" idx="5"/>
+          </p:nvPr>
+        </p:nvSpPr>
+        <p:spPr>
+          <a:xfrm>
+            <a:off x="3884613" y="8685213"/>
+            <a:ext cx="2971800" cy="458787"/>
+          </a:xfrm>
+          <a:prstGeom prst="rect">
+            <a:avLst/>
+          </a:prstGeom>
+        </p:spPr>
+        <p:txBody>
+          <a:bodyPr vert="horz" lIns="91440" tIns="45720" rIns="91440" bIns="45720" rtlCol="0" anchor="b"/>
+          <a:lstStyle>
+            <a:lvl1pPr algn="r">
+              <a:defRPr sz="1200"/>
+            </a:lvl1pPr>
+          </a:lstStyle>
+          <a:p>
+            <a:fld id="{50E1AF1E-D24C-4BA5-8E41-991FB2B95C45}" type="slidenum">
+              <a:rPr lang="en-GB" smtClean="0"/>
+              <a:t>‹#›</a:t>
+            </a:fld>
+            <a:endParaRPr lang="en-GB"/>
+          </a:p>
+        </p:txBody>
+      </p:sp>
+    </p:spTree>
+    <p:extLst>
+      <p:ext uri="{BB962C8B-B14F-4D97-AF65-F5344CB8AC3E}">
+        <p14:creationId xmlns:p14="http://schemas.microsoft.com/office/powerpoint/2010/main" val="1897807793"/>
+      </p:ext>
+    </p:extLst>
+  </p:cSld>
+  <p:clrMap bg1="lt1" tx1="dk1" bg2="lt2" tx2="dk2" accent1="accent1" accent2="accent2" accent3="accent3" accent4="accent4" accent5="accent5" accent6="accent6" hlink="hlink" folHlink="folHlink"/>
+  <p:notesStyle>
+    <a:lvl1pPr marL="0" algn="l" defTabSz="914400" rtl="0" eaLnBrk="1" latinLnBrk="0" hangingPunct="1">
+      <a:defRPr sz="1200" kern="1200">
+        <a:solidFill>
+          <a:schemeClr val="tx1"/>
+        </a:solidFill>
+        <a:latin typeface="+mn-lt"/>
+        <a:ea typeface="+mn-ea"/>
+        <a:cs typeface="+mn-cs"/>
+      </a:defRPr>
+    </a:lvl1pPr>
+    <a:lvl2pPr marL="457200" algn="l" defTabSz="914400" rtl="0" eaLnBrk="1" latinLnBrk="0" hangingPunct="1">
+      <a:defRPr sz="1200" kern="1200">
+        <a:solidFill>
+          <a:schemeClr val="tx1"/>
+        </a:solidFill>
+        <a:latin typeface="+mn-lt"/>
+        <a:ea typeface="+mn-ea"/>
+        <a:cs typeface="+mn-cs"/>
+      </a:defRPr>
+    </a:lvl2pPr>
+    <a:lvl3pPr marL="914400" algn="l" defTabSz="914400" rtl="0" eaLnBrk="1" latinLnBrk="0" hangingPunct="1">
+      <a:defRPr sz="1200" kern="1200">
+        <a:solidFill>
+          <a:schemeClr val="tx1"/>
+        </a:solidFill>
+        <a:latin typeface="+mn-lt"/>
+        <a:ea typeface="+mn-ea"/>
+        <a:cs typeface="+mn-cs"/>
+      </a:defRPr>
+    </a:lvl3pPr>
+    <a:lvl4pPr marL="1371600" algn="l" defTabSz="914400" rtl="0" eaLnBrk="1" latinLnBrk="0" hangingPunct="1">
+      <a:defRPr sz="1200" kern="1200">
+        <a:solidFill>
+          <a:schemeClr val="tx1"/>
+        </a:solidFill>
+        <a:latin typeface="+mn-lt"/>
+        <a:ea typeface="+mn-ea"/>
+        <a:cs typeface="+mn-cs"/>
+      </a:defRPr>
+    </a:lvl4pPr>
+    <a:lvl5pPr marL="1828800" algn="l" defTabSz="914400" rtl="0" eaLnBrk="1" latinLnBrk="0" hangingPunct="1">
+      <a:defRPr sz="1200" kern="1200">
+        <a:solidFill>
+          <a:schemeClr val="tx1"/>
+        </a:solidFill>
+        <a:latin typeface="+mn-lt"/>
+        <a:ea typeface="+mn-ea"/>
+        <a:cs typeface="+mn-cs"/>
+      </a:defRPr>
+    </a:lvl5pPr>
+    <a:lvl6pPr marL="2286000" algn="l" defTabSz="914400" rtl="0" eaLnBrk="1" latinLnBrk="0" hangingPunct="1">
+      <a:defRPr sz="1200" kern="1200">
+        <a:solidFill>
+          <a:schemeClr val="tx1"/>
+        </a:solidFill>
+        <a:latin typeface="+mn-lt"/>
+        <a:ea typeface="+mn-ea"/>
+        <a:cs typeface="+mn-cs"/>
+      </a:defRPr>
+    </a:lvl6pPr>
+    <a:lvl7pPr marL="2743200" algn="l" defTabSz="914400" rtl="0" eaLnBrk="1" latinLnBrk="0" hangingPunct="1">
+      <a:defRPr sz="1200" kern="1200">
+        <a:solidFill>
+          <a:schemeClr val="tx1"/>
+        </a:solidFill>
+        <a:latin typeface="+mn-lt"/>
+        <a:ea typeface="+mn-ea"/>
+        <a:cs typeface="+mn-cs"/>
+      </a:defRPr>
+    </a:lvl7pPr>
+    <a:lvl8pPr marL="3200400" algn="l" defTabSz="914400" rtl="0" eaLnBrk="1" latinLnBrk="0" hangingPunct="1">
+      <a:defRPr sz="1200" kern="1200">
+        <a:solidFill>
+          <a:schemeClr val="tx1"/>
+        </a:solidFill>
+        <a:latin typeface="+mn-lt"/>
+        <a:ea typeface="+mn-ea"/>
+        <a:cs typeface="+mn-cs"/>
+      </a:defRPr>
+    </a:lvl8pPr>
+    <a:lvl9pPr marL="3657600" algn="l" defTabSz="914400" rtl="0" eaLnBrk="1" latinLnBrk="0" hangingPunct="1">
+      <a:defRPr sz="1200" kern="1200">
+        <a:solidFill>
+          <a:schemeClr val="tx1"/>
+        </a:solidFill>
+        <a:latin typeface="+mn-lt"/>
+        <a:ea typeface="+mn-ea"/>
+        <a:cs typeface="+mn-cs"/>
+      </a:defRPr>
+    </a:lvl9pPr>
+  </p:notesStyle>
+</p:notesMaster>
+</file>
+
+<file path=ppt/notesSlides/notesSlide1.xml><?xml version="1.0" encoding="utf-8"?>
+<p:notes xmlns:a="http://schemas.openxmlformats.org/drawingml/2006/main" xmlns:r="http://schemas.openxmlformats.org/officeDocument/2006/relationships" xmlns:p="http://schemas.openxmlformats.org/presentationml/2006/main">
+  <p:cSld>
+    <p:spTree>
+      <p:nvGrpSpPr>
+        <p:cNvPr id="1" name=""/>
+        <p:cNvGrpSpPr/>
+        <p:nvPr/>
+      </p:nvGrpSpPr>
+      <p:grpSpPr>
+        <a:xfrm>
+          <a:off x="0" y="0"/>
+          <a:ext cx="0" cy="0"/>
+          <a:chOff x="0" y="0"/>
+          <a:chExt cx="0" cy="0"/>
+        </a:xfrm>
+      </p:grpSpPr>
+      <p:sp>
+        <p:nvSpPr>
+          <p:cNvPr id="2" name="Slide Image Placeholder 1"/>
+          <p:cNvSpPr>
+            <a:spLocks noGrp="1" noRot="1" noChangeAspect="1"/>
+          </p:cNvSpPr>
+          <p:nvPr>
+            <p:ph type="sldImg"/>
+          </p:nvPr>
+        </p:nvSpPr>
+        <p:spPr/>
+      </p:sp>
+      <p:sp>
+        <p:nvSpPr>
+          <p:cNvPr id="3" name="Notes Placeholder 2"/>
+          <p:cNvSpPr>
+            <a:spLocks noGrp="1"/>
+          </p:cNvSpPr>
+          <p:nvPr>
+            <p:ph type="body" idx="1"/>
+          </p:nvPr>
+        </p:nvSpPr>
+        <p:spPr/>
+        <p:txBody>
+          <a:bodyPr/>
+          <a:lstStyle/>
+          <a:p>
+            <a:r>
+              <a:rPr lang="en-GB" dirty="0"/>
+              <a:t>What this does is assigns an event listener to react to a socket connecting to the server.</a:t>
+            </a:r>
+          </a:p>
+          <a:p>
+            <a:endParaRPr lang="en-GB" dirty="0"/>
+          </a:p>
+          <a:p>
+            <a:r>
+              <a:rPr lang="en-GB" dirty="0"/>
+              <a:t>This callback will be ran for each socket when they connect to the server. Each socket represents a two way communication between server </a:t>
+            </a:r>
+            <a:r>
+              <a:rPr lang="en-GB"/>
+              <a:t>and client</a:t>
+            </a:r>
+          </a:p>
+        </p:txBody>
+      </p:sp>
+      <p:sp>
+        <p:nvSpPr>
+          <p:cNvPr id="4" name="Slide Number Placeholder 3"/>
+          <p:cNvSpPr>
+            <a:spLocks noGrp="1"/>
+          </p:cNvSpPr>
+          <p:nvPr>
+            <p:ph type="sldNum" sz="quarter" idx="5"/>
+          </p:nvPr>
+        </p:nvSpPr>
+        <p:spPr/>
+        <p:txBody>
+          <a:bodyPr/>
+          <a:lstStyle/>
+          <a:p>
+            <a:fld id="{50E1AF1E-D24C-4BA5-8E41-991FB2B95C45}" type="slidenum">
+              <a:rPr lang="en-GB" smtClean="0"/>
+              <a:t>11</a:t>
+            </a:fld>
+            <a:endParaRPr lang="en-GB"/>
+          </a:p>
+        </p:txBody>
+      </p:sp>
+    </p:spTree>
+    <p:extLst>
+      <p:ext uri="{BB962C8B-B14F-4D97-AF65-F5344CB8AC3E}">
+        <p14:creationId xmlns:p14="http://schemas.microsoft.com/office/powerpoint/2010/main" val="2775269414"/>
+      </p:ext>
+    </p:extLst>
+  </p:cSld>
+  <p:clrMapOvr>
+    <a:masterClrMapping/>
+  </p:clrMapOvr>
+</p:notes>
 </file>
 
 <file path=ppt/slideLayouts/slideLayout1.xml><?xml version="1.0" encoding="utf-8"?>
@@ -3424,6 +3890,1068 @@
 </p:sld>
 </file>
 
+<file path=ppt/slides/slide10.xml><?xml version="1.0" encoding="utf-8"?>
+<p:sld xmlns:a="http://schemas.openxmlformats.org/drawingml/2006/main" xmlns:r="http://schemas.openxmlformats.org/officeDocument/2006/relationships" xmlns:p="http://schemas.openxmlformats.org/presentationml/2006/main">
+  <p:cSld>
+    <p:spTree>
+      <p:nvGrpSpPr>
+        <p:cNvPr id="1" name=""/>
+        <p:cNvGrpSpPr/>
+        <p:nvPr/>
+      </p:nvGrpSpPr>
+      <p:grpSpPr>
+        <a:xfrm>
+          <a:off x="0" y="0"/>
+          <a:ext cx="0" cy="0"/>
+          <a:chOff x="0" y="0"/>
+          <a:chExt cx="0" cy="0"/>
+        </a:xfrm>
+      </p:grpSpPr>
+      <p:sp>
+        <p:nvSpPr>
+          <p:cNvPr id="2" name="Title 1">
+            <a:extLst>
+              <a:ext uri="{FF2B5EF4-FFF2-40B4-BE49-F238E27FC236}">
+                <a16:creationId xmlns:a16="http://schemas.microsoft.com/office/drawing/2014/main" id="{C920BE92-F0B9-6C3E-6D57-E4BA1AFE31C7}"/>
+              </a:ext>
+            </a:extLst>
+          </p:cNvPr>
+          <p:cNvSpPr>
+            <a:spLocks noGrp="1"/>
+          </p:cNvSpPr>
+          <p:nvPr>
+            <p:ph type="title"/>
+          </p:nvPr>
+        </p:nvSpPr>
+        <p:spPr/>
+        <p:txBody>
+          <a:bodyPr/>
+          <a:lstStyle/>
+          <a:p>
+            <a:r>
+              <a:rPr lang="en-GB" dirty="0"/>
+              <a:t>Server Side Functions</a:t>
+            </a:r>
+          </a:p>
+        </p:txBody>
+      </p:sp>
+      <p:sp>
+        <p:nvSpPr>
+          <p:cNvPr id="3" name="Content Placeholder 2">
+            <a:extLst>
+              <a:ext uri="{FF2B5EF4-FFF2-40B4-BE49-F238E27FC236}">
+                <a16:creationId xmlns:a16="http://schemas.microsoft.com/office/drawing/2014/main" id="{32E5A470-FAE8-6757-EE71-FF216C0C33E1}"/>
+              </a:ext>
+            </a:extLst>
+          </p:cNvPr>
+          <p:cNvSpPr>
+            <a:spLocks noGrp="1"/>
+          </p:cNvSpPr>
+          <p:nvPr>
+            <p:ph idx="1"/>
+          </p:nvPr>
+        </p:nvSpPr>
+        <p:spPr/>
+        <p:txBody>
+          <a:bodyPr/>
+          <a:lstStyle/>
+          <a:p>
+            <a:endParaRPr lang="en-GB"/>
+          </a:p>
+        </p:txBody>
+      </p:sp>
+    </p:spTree>
+    <p:extLst>
+      <p:ext uri="{BB962C8B-B14F-4D97-AF65-F5344CB8AC3E}">
+        <p14:creationId xmlns:p14="http://schemas.microsoft.com/office/powerpoint/2010/main" val="4072906594"/>
+      </p:ext>
+    </p:extLst>
+  </p:cSld>
+  <p:clrMapOvr>
+    <a:masterClrMapping/>
+  </p:clrMapOvr>
+</p:sld>
+</file>
+
+<file path=ppt/slides/slide11.xml><?xml version="1.0" encoding="utf-8"?>
+<p:sld xmlns:a="http://schemas.openxmlformats.org/drawingml/2006/main" xmlns:r="http://schemas.openxmlformats.org/officeDocument/2006/relationships" xmlns:p="http://schemas.openxmlformats.org/presentationml/2006/main">
+  <p:cSld>
+    <p:spTree>
+      <p:nvGrpSpPr>
+        <p:cNvPr id="1" name=""/>
+        <p:cNvGrpSpPr/>
+        <p:nvPr/>
+      </p:nvGrpSpPr>
+      <p:grpSpPr>
+        <a:xfrm>
+          <a:off x="0" y="0"/>
+          <a:ext cx="0" cy="0"/>
+          <a:chOff x="0" y="0"/>
+          <a:chExt cx="0" cy="0"/>
+        </a:xfrm>
+      </p:grpSpPr>
+      <p:sp>
+        <p:nvSpPr>
+          <p:cNvPr id="2" name="Title 1">
+            <a:extLst>
+              <a:ext uri="{FF2B5EF4-FFF2-40B4-BE49-F238E27FC236}">
+                <a16:creationId xmlns:a16="http://schemas.microsoft.com/office/drawing/2014/main" id="{BAED0FA1-CF08-585F-FF47-AFD7C163B7D2}"/>
+              </a:ext>
+            </a:extLst>
+          </p:cNvPr>
+          <p:cNvSpPr>
+            <a:spLocks noGrp="1"/>
+          </p:cNvSpPr>
+          <p:nvPr>
+            <p:ph type="title"/>
+          </p:nvPr>
+        </p:nvSpPr>
+        <p:spPr/>
+        <p:txBody>
+          <a:bodyPr/>
+          <a:lstStyle/>
+          <a:p>
+            <a:endParaRPr lang="en-GB" dirty="0"/>
+          </a:p>
+        </p:txBody>
+      </p:sp>
+      <p:pic>
+        <p:nvPicPr>
+          <p:cNvPr id="5" name="Content Placeholder 4" descr="A screen shot of a computer&#10;&#10;Description automatically generated">
+            <a:extLst>
+              <a:ext uri="{FF2B5EF4-FFF2-40B4-BE49-F238E27FC236}">
+                <a16:creationId xmlns:a16="http://schemas.microsoft.com/office/drawing/2014/main" id="{AA41B947-8996-21C4-DA25-2D7B6BBB455E}"/>
+              </a:ext>
+            </a:extLst>
+          </p:cNvPr>
+          <p:cNvPicPr>
+            <a:picLocks noGrp="1" noChangeAspect="1"/>
+          </p:cNvPicPr>
+          <p:nvPr>
+            <p:ph idx="1"/>
+          </p:nvPr>
+        </p:nvPicPr>
+        <p:blipFill>
+          <a:blip r:embed="rId3">
+            <a:extLst>
+              <a:ext uri="{28A0092B-C50C-407E-A947-70E740481C1C}">
+                <a14:useLocalDpi xmlns:a14="http://schemas.microsoft.com/office/drawing/2010/main" val="0"/>
+              </a:ext>
+            </a:extLst>
+          </a:blip>
+          <a:stretch>
+            <a:fillRect/>
+          </a:stretch>
+        </p:blipFill>
+        <p:spPr>
+          <a:xfrm>
+            <a:off x="1611999" y="1825625"/>
+            <a:ext cx="8968001" cy="4351338"/>
+          </a:xfrm>
+        </p:spPr>
+      </p:pic>
+      <p:sp>
+        <p:nvSpPr>
+          <p:cNvPr id="6" name="TextBox 5">
+            <a:extLst>
+              <a:ext uri="{FF2B5EF4-FFF2-40B4-BE49-F238E27FC236}">
+                <a16:creationId xmlns:a16="http://schemas.microsoft.com/office/drawing/2014/main" id="{0DCEC26F-0A62-619C-A65E-A24AA9F09E2F}"/>
+              </a:ext>
+            </a:extLst>
+          </p:cNvPr>
+          <p:cNvSpPr txBox="1"/>
+          <p:nvPr/>
+        </p:nvSpPr>
+        <p:spPr>
+          <a:xfrm>
+            <a:off x="176980" y="1825625"/>
+            <a:ext cx="5466735" cy="646331"/>
+          </a:xfrm>
+          <a:prstGeom prst="rect">
+            <a:avLst/>
+          </a:prstGeom>
+          <a:noFill/>
+        </p:spPr>
+        <p:txBody>
+          <a:bodyPr wrap="square" rtlCol="0">
+            <a:spAutoFit/>
+          </a:bodyPr>
+          <a:lstStyle/>
+          <a:p>
+            <a:r>
+              <a:rPr lang="en-GB" dirty="0"/>
+              <a:t>Assume io here is an object accessible from this scope</a:t>
+            </a:r>
+          </a:p>
+        </p:txBody>
+      </p:sp>
+    </p:spTree>
+    <p:extLst>
+      <p:ext uri="{BB962C8B-B14F-4D97-AF65-F5344CB8AC3E}">
+        <p14:creationId xmlns:p14="http://schemas.microsoft.com/office/powerpoint/2010/main" val="2207662337"/>
+      </p:ext>
+    </p:extLst>
+  </p:cSld>
+  <p:clrMapOvr>
+    <a:masterClrMapping/>
+  </p:clrMapOvr>
+</p:sld>
+</file>
+
+<file path=ppt/slides/slide12.xml><?xml version="1.0" encoding="utf-8"?>
+<p:sld xmlns:a="http://schemas.openxmlformats.org/drawingml/2006/main" xmlns:r="http://schemas.openxmlformats.org/officeDocument/2006/relationships" xmlns:p="http://schemas.openxmlformats.org/presentationml/2006/main">
+  <p:cSld>
+    <p:spTree>
+      <p:nvGrpSpPr>
+        <p:cNvPr id="1" name=""/>
+        <p:cNvGrpSpPr/>
+        <p:nvPr/>
+      </p:nvGrpSpPr>
+      <p:grpSpPr>
+        <a:xfrm>
+          <a:off x="0" y="0"/>
+          <a:ext cx="0" cy="0"/>
+          <a:chOff x="0" y="0"/>
+          <a:chExt cx="0" cy="0"/>
+        </a:xfrm>
+      </p:grpSpPr>
+      <p:sp>
+        <p:nvSpPr>
+          <p:cNvPr id="2" name="Title 1">
+            <a:extLst>
+              <a:ext uri="{FF2B5EF4-FFF2-40B4-BE49-F238E27FC236}">
+                <a16:creationId xmlns:a16="http://schemas.microsoft.com/office/drawing/2014/main" id="{6460988F-9C97-4A28-2543-B68C057C1224}"/>
+              </a:ext>
+            </a:extLst>
+          </p:cNvPr>
+          <p:cNvSpPr>
+            <a:spLocks noGrp="1"/>
+          </p:cNvSpPr>
+          <p:nvPr>
+            <p:ph type="title"/>
+          </p:nvPr>
+        </p:nvSpPr>
+        <p:spPr/>
+        <p:txBody>
+          <a:bodyPr/>
+          <a:lstStyle/>
+          <a:p>
+            <a:endParaRPr lang="en-GB" dirty="0"/>
+          </a:p>
+        </p:txBody>
+      </p:sp>
+      <p:pic>
+        <p:nvPicPr>
+          <p:cNvPr id="5" name="Content Placeholder 4" descr="A screen shot of a computer program&#10;&#10;Description automatically generated">
+            <a:extLst>
+              <a:ext uri="{FF2B5EF4-FFF2-40B4-BE49-F238E27FC236}">
+                <a16:creationId xmlns:a16="http://schemas.microsoft.com/office/drawing/2014/main" id="{10C2B391-E1B7-0764-4D19-80A09C70D943}"/>
+              </a:ext>
+            </a:extLst>
+          </p:cNvPr>
+          <p:cNvPicPr>
+            <a:picLocks noGrp="1" noChangeAspect="1"/>
+          </p:cNvPicPr>
+          <p:nvPr>
+            <p:ph idx="1"/>
+          </p:nvPr>
+        </p:nvPicPr>
+        <p:blipFill>
+          <a:blip r:embed="rId2">
+            <a:extLst>
+              <a:ext uri="{28A0092B-C50C-407E-A947-70E740481C1C}">
+                <a14:useLocalDpi xmlns:a14="http://schemas.microsoft.com/office/drawing/2010/main" val="0"/>
+              </a:ext>
+            </a:extLst>
+          </a:blip>
+          <a:stretch>
+            <a:fillRect/>
+          </a:stretch>
+        </p:blipFill>
+        <p:spPr>
+          <a:xfrm>
+            <a:off x="1933494" y="1825625"/>
+            <a:ext cx="8325012" cy="4351338"/>
+          </a:xfrm>
+        </p:spPr>
+      </p:pic>
+      <p:sp>
+        <p:nvSpPr>
+          <p:cNvPr id="6" name="TextBox 5">
+            <a:extLst>
+              <a:ext uri="{FF2B5EF4-FFF2-40B4-BE49-F238E27FC236}">
+                <a16:creationId xmlns:a16="http://schemas.microsoft.com/office/drawing/2014/main" id="{70C7F3A9-EB4F-9747-8385-16995CE21352}"/>
+              </a:ext>
+            </a:extLst>
+          </p:cNvPr>
+          <p:cNvSpPr txBox="1"/>
+          <p:nvPr/>
+        </p:nvSpPr>
+        <p:spPr>
+          <a:xfrm>
+            <a:off x="176980" y="1825625"/>
+            <a:ext cx="5466735" cy="646331"/>
+          </a:xfrm>
+          <a:prstGeom prst="rect">
+            <a:avLst/>
+          </a:prstGeom>
+          <a:noFill/>
+        </p:spPr>
+        <p:txBody>
+          <a:bodyPr wrap="square" rtlCol="0">
+            <a:spAutoFit/>
+          </a:bodyPr>
+          <a:lstStyle/>
+          <a:p>
+            <a:r>
+              <a:rPr lang="en-GB" dirty="0"/>
+              <a:t>Assume socket here is an object accessible from this scope</a:t>
+            </a:r>
+          </a:p>
+        </p:txBody>
+      </p:sp>
+    </p:spTree>
+    <p:extLst>
+      <p:ext uri="{BB962C8B-B14F-4D97-AF65-F5344CB8AC3E}">
+        <p14:creationId xmlns:p14="http://schemas.microsoft.com/office/powerpoint/2010/main" val="269911887"/>
+      </p:ext>
+    </p:extLst>
+  </p:cSld>
+  <p:clrMapOvr>
+    <a:masterClrMapping/>
+  </p:clrMapOvr>
+</p:sld>
+</file>
+
+<file path=ppt/slides/slide13.xml><?xml version="1.0" encoding="utf-8"?>
+<p:sld xmlns:a="http://schemas.openxmlformats.org/drawingml/2006/main" xmlns:r="http://schemas.openxmlformats.org/officeDocument/2006/relationships" xmlns:p="http://schemas.openxmlformats.org/presentationml/2006/main">
+  <p:cSld>
+    <p:spTree>
+      <p:nvGrpSpPr>
+        <p:cNvPr id="1" name=""/>
+        <p:cNvGrpSpPr/>
+        <p:nvPr/>
+      </p:nvGrpSpPr>
+      <p:grpSpPr>
+        <a:xfrm>
+          <a:off x="0" y="0"/>
+          <a:ext cx="0" cy="0"/>
+          <a:chOff x="0" y="0"/>
+          <a:chExt cx="0" cy="0"/>
+        </a:xfrm>
+      </p:grpSpPr>
+      <p:sp>
+        <p:nvSpPr>
+          <p:cNvPr id="2" name="Title 1">
+            <a:extLst>
+              <a:ext uri="{FF2B5EF4-FFF2-40B4-BE49-F238E27FC236}">
+                <a16:creationId xmlns:a16="http://schemas.microsoft.com/office/drawing/2014/main" id="{F9080EC7-1FAD-8E2C-25D2-9551601EF96B}"/>
+              </a:ext>
+            </a:extLst>
+          </p:cNvPr>
+          <p:cNvSpPr>
+            <a:spLocks noGrp="1"/>
+          </p:cNvSpPr>
+          <p:nvPr>
+            <p:ph type="title"/>
+          </p:nvPr>
+        </p:nvSpPr>
+        <p:spPr/>
+        <p:txBody>
+          <a:bodyPr/>
+          <a:lstStyle/>
+          <a:p>
+            <a:endParaRPr lang="en-GB"/>
+          </a:p>
+        </p:txBody>
+      </p:sp>
+      <p:pic>
+        <p:nvPicPr>
+          <p:cNvPr id="5" name="Content Placeholder 4" descr="A screen shot of a computer program&#10;&#10;Description automatically generated">
+            <a:extLst>
+              <a:ext uri="{FF2B5EF4-FFF2-40B4-BE49-F238E27FC236}">
+                <a16:creationId xmlns:a16="http://schemas.microsoft.com/office/drawing/2014/main" id="{5DD67B21-641E-8B4C-1A9C-651760FFFB93}"/>
+              </a:ext>
+            </a:extLst>
+          </p:cNvPr>
+          <p:cNvPicPr>
+            <a:picLocks noGrp="1" noChangeAspect="1"/>
+          </p:cNvPicPr>
+          <p:nvPr>
+            <p:ph idx="1"/>
+          </p:nvPr>
+        </p:nvPicPr>
+        <p:blipFill>
+          <a:blip r:embed="rId2">
+            <a:extLst>
+              <a:ext uri="{28A0092B-C50C-407E-A947-70E740481C1C}">
+                <a14:useLocalDpi xmlns:a14="http://schemas.microsoft.com/office/drawing/2010/main" val="0"/>
+              </a:ext>
+            </a:extLst>
+          </a:blip>
+          <a:stretch>
+            <a:fillRect/>
+          </a:stretch>
+        </p:blipFill>
+        <p:spPr>
+          <a:xfrm>
+            <a:off x="1588671" y="1825625"/>
+            <a:ext cx="9014658" cy="4351338"/>
+          </a:xfrm>
+        </p:spPr>
+      </p:pic>
+      <p:sp>
+        <p:nvSpPr>
+          <p:cNvPr id="6" name="TextBox 5">
+            <a:extLst>
+              <a:ext uri="{FF2B5EF4-FFF2-40B4-BE49-F238E27FC236}">
+                <a16:creationId xmlns:a16="http://schemas.microsoft.com/office/drawing/2014/main" id="{F95A93AD-E37C-CA42-66BF-3D9FCFEFD39C}"/>
+              </a:ext>
+            </a:extLst>
+          </p:cNvPr>
+          <p:cNvSpPr txBox="1"/>
+          <p:nvPr/>
+        </p:nvSpPr>
+        <p:spPr>
+          <a:xfrm>
+            <a:off x="176980" y="1825625"/>
+            <a:ext cx="5466735" cy="646331"/>
+          </a:xfrm>
+          <a:prstGeom prst="rect">
+            <a:avLst/>
+          </a:prstGeom>
+          <a:noFill/>
+        </p:spPr>
+        <p:txBody>
+          <a:bodyPr wrap="square" rtlCol="0">
+            <a:spAutoFit/>
+          </a:bodyPr>
+          <a:lstStyle/>
+          <a:p>
+            <a:r>
+              <a:rPr lang="en-GB" dirty="0"/>
+              <a:t>Assume socket here is an object accessible from this scope</a:t>
+            </a:r>
+          </a:p>
+        </p:txBody>
+      </p:sp>
+    </p:spTree>
+    <p:extLst>
+      <p:ext uri="{BB962C8B-B14F-4D97-AF65-F5344CB8AC3E}">
+        <p14:creationId xmlns:p14="http://schemas.microsoft.com/office/powerpoint/2010/main" val="3717868015"/>
+      </p:ext>
+    </p:extLst>
+  </p:cSld>
+  <p:clrMapOvr>
+    <a:masterClrMapping/>
+  </p:clrMapOvr>
+</p:sld>
+</file>
+
+<file path=ppt/slides/slide14.xml><?xml version="1.0" encoding="utf-8"?>
+<p:sld xmlns:a="http://schemas.openxmlformats.org/drawingml/2006/main" xmlns:r="http://schemas.openxmlformats.org/officeDocument/2006/relationships" xmlns:p="http://schemas.openxmlformats.org/presentationml/2006/main">
+  <p:cSld>
+    <p:spTree>
+      <p:nvGrpSpPr>
+        <p:cNvPr id="1" name=""/>
+        <p:cNvGrpSpPr/>
+        <p:nvPr/>
+      </p:nvGrpSpPr>
+      <p:grpSpPr>
+        <a:xfrm>
+          <a:off x="0" y="0"/>
+          <a:ext cx="0" cy="0"/>
+          <a:chOff x="0" y="0"/>
+          <a:chExt cx="0" cy="0"/>
+        </a:xfrm>
+      </p:grpSpPr>
+      <p:sp>
+        <p:nvSpPr>
+          <p:cNvPr id="2" name="Title 1">
+            <a:extLst>
+              <a:ext uri="{FF2B5EF4-FFF2-40B4-BE49-F238E27FC236}">
+                <a16:creationId xmlns:a16="http://schemas.microsoft.com/office/drawing/2014/main" id="{19388490-D0AF-03A7-0860-634403F8E377}"/>
+              </a:ext>
+            </a:extLst>
+          </p:cNvPr>
+          <p:cNvSpPr>
+            <a:spLocks noGrp="1"/>
+          </p:cNvSpPr>
+          <p:nvPr>
+            <p:ph type="title"/>
+          </p:nvPr>
+        </p:nvSpPr>
+        <p:spPr/>
+        <p:txBody>
+          <a:bodyPr/>
+          <a:lstStyle/>
+          <a:p>
+            <a:endParaRPr lang="en-GB"/>
+          </a:p>
+        </p:txBody>
+      </p:sp>
+      <p:pic>
+        <p:nvPicPr>
+          <p:cNvPr id="5" name="Content Placeholder 4" descr="A screen shot of a computer&#10;&#10;Description automatically generated">
+            <a:extLst>
+              <a:ext uri="{FF2B5EF4-FFF2-40B4-BE49-F238E27FC236}">
+                <a16:creationId xmlns:a16="http://schemas.microsoft.com/office/drawing/2014/main" id="{878815D2-50F8-CC08-0C56-C9870C2B08F4}"/>
+              </a:ext>
+            </a:extLst>
+          </p:cNvPr>
+          <p:cNvPicPr>
+            <a:picLocks noGrp="1" noChangeAspect="1"/>
+          </p:cNvPicPr>
+          <p:nvPr>
+            <p:ph idx="1"/>
+          </p:nvPr>
+        </p:nvPicPr>
+        <p:blipFill>
+          <a:blip r:embed="rId2">
+            <a:extLst>
+              <a:ext uri="{28A0092B-C50C-407E-A947-70E740481C1C}">
+                <a14:useLocalDpi xmlns:a14="http://schemas.microsoft.com/office/drawing/2010/main" val="0"/>
+              </a:ext>
+            </a:extLst>
+          </a:blip>
+          <a:stretch>
+            <a:fillRect/>
+          </a:stretch>
+        </p:blipFill>
+        <p:spPr>
+          <a:xfrm>
+            <a:off x="2653486" y="1825625"/>
+            <a:ext cx="6885028" cy="4351338"/>
+          </a:xfrm>
+        </p:spPr>
+      </p:pic>
+      <p:sp>
+        <p:nvSpPr>
+          <p:cNvPr id="6" name="TextBox 5">
+            <a:extLst>
+              <a:ext uri="{FF2B5EF4-FFF2-40B4-BE49-F238E27FC236}">
+                <a16:creationId xmlns:a16="http://schemas.microsoft.com/office/drawing/2014/main" id="{555403C6-3D75-191C-3F29-97885911C9F5}"/>
+              </a:ext>
+            </a:extLst>
+          </p:cNvPr>
+          <p:cNvSpPr txBox="1"/>
+          <p:nvPr/>
+        </p:nvSpPr>
+        <p:spPr>
+          <a:xfrm>
+            <a:off x="176980" y="1825625"/>
+            <a:ext cx="5466735" cy="646331"/>
+          </a:xfrm>
+          <a:prstGeom prst="rect">
+            <a:avLst/>
+          </a:prstGeom>
+          <a:noFill/>
+        </p:spPr>
+        <p:txBody>
+          <a:bodyPr wrap="square" rtlCol="0">
+            <a:spAutoFit/>
+          </a:bodyPr>
+          <a:lstStyle/>
+          <a:p>
+            <a:r>
+              <a:rPr lang="en-GB" dirty="0"/>
+              <a:t>Assume socket here is an object accessible from this scope</a:t>
+            </a:r>
+          </a:p>
+        </p:txBody>
+      </p:sp>
+    </p:spTree>
+    <p:extLst>
+      <p:ext uri="{BB962C8B-B14F-4D97-AF65-F5344CB8AC3E}">
+        <p14:creationId xmlns:p14="http://schemas.microsoft.com/office/powerpoint/2010/main" val="3569354206"/>
+      </p:ext>
+    </p:extLst>
+  </p:cSld>
+  <p:clrMapOvr>
+    <a:masterClrMapping/>
+  </p:clrMapOvr>
+</p:sld>
+</file>
+
+<file path=ppt/slides/slide15.xml><?xml version="1.0" encoding="utf-8"?>
+<p:sld xmlns:a="http://schemas.openxmlformats.org/drawingml/2006/main" xmlns:r="http://schemas.openxmlformats.org/officeDocument/2006/relationships" xmlns:p="http://schemas.openxmlformats.org/presentationml/2006/main">
+  <p:cSld>
+    <p:spTree>
+      <p:nvGrpSpPr>
+        <p:cNvPr id="1" name=""/>
+        <p:cNvGrpSpPr/>
+        <p:nvPr/>
+      </p:nvGrpSpPr>
+      <p:grpSpPr>
+        <a:xfrm>
+          <a:off x="0" y="0"/>
+          <a:ext cx="0" cy="0"/>
+          <a:chOff x="0" y="0"/>
+          <a:chExt cx="0" cy="0"/>
+        </a:xfrm>
+      </p:grpSpPr>
+      <p:sp>
+        <p:nvSpPr>
+          <p:cNvPr id="2" name="Title 1">
+            <a:extLst>
+              <a:ext uri="{FF2B5EF4-FFF2-40B4-BE49-F238E27FC236}">
+                <a16:creationId xmlns:a16="http://schemas.microsoft.com/office/drawing/2014/main" id="{E54229D8-919A-09EE-7DDD-19DADA3C77BE}"/>
+              </a:ext>
+            </a:extLst>
+          </p:cNvPr>
+          <p:cNvSpPr>
+            <a:spLocks noGrp="1"/>
+          </p:cNvSpPr>
+          <p:nvPr>
+            <p:ph type="title"/>
+          </p:nvPr>
+        </p:nvSpPr>
+        <p:spPr/>
+        <p:txBody>
+          <a:bodyPr/>
+          <a:lstStyle/>
+          <a:p>
+            <a:r>
+              <a:rPr lang="en-GB" dirty="0"/>
+              <a:t>All Together</a:t>
+            </a:r>
+          </a:p>
+        </p:txBody>
+      </p:sp>
+      <p:pic>
+        <p:nvPicPr>
+          <p:cNvPr id="5" name="Content Placeholder 4" descr="A screenshot of a computer program&#10;&#10;Description automatically generated">
+            <a:extLst>
+              <a:ext uri="{FF2B5EF4-FFF2-40B4-BE49-F238E27FC236}">
+                <a16:creationId xmlns:a16="http://schemas.microsoft.com/office/drawing/2014/main" id="{A3D18305-61C7-2CD2-A3E0-116BE3C2FC56}"/>
+              </a:ext>
+            </a:extLst>
+          </p:cNvPr>
+          <p:cNvPicPr>
+            <a:picLocks noGrp="1" noChangeAspect="1"/>
+          </p:cNvPicPr>
+          <p:nvPr>
+            <p:ph idx="1"/>
+          </p:nvPr>
+        </p:nvPicPr>
+        <p:blipFill>
+          <a:blip r:embed="rId2">
+            <a:extLst>
+              <a:ext uri="{28A0092B-C50C-407E-A947-70E740481C1C}">
+                <a14:useLocalDpi xmlns:a14="http://schemas.microsoft.com/office/drawing/2010/main" val="0"/>
+              </a:ext>
+            </a:extLst>
+          </a:blip>
+          <a:stretch>
+            <a:fillRect/>
+          </a:stretch>
+        </p:blipFill>
+        <p:spPr>
+          <a:xfrm>
+            <a:off x="2790282" y="1825625"/>
+            <a:ext cx="6611435" cy="4351338"/>
+          </a:xfrm>
+        </p:spPr>
+      </p:pic>
+    </p:spTree>
+    <p:extLst>
+      <p:ext uri="{BB962C8B-B14F-4D97-AF65-F5344CB8AC3E}">
+        <p14:creationId xmlns:p14="http://schemas.microsoft.com/office/powerpoint/2010/main" val="1923285680"/>
+      </p:ext>
+    </p:extLst>
+  </p:cSld>
+  <p:clrMapOvr>
+    <a:masterClrMapping/>
+  </p:clrMapOvr>
+</p:sld>
+</file>
+
+<file path=ppt/slides/slide16.xml><?xml version="1.0" encoding="utf-8"?>
+<p:sld xmlns:a="http://schemas.openxmlformats.org/drawingml/2006/main" xmlns:r="http://schemas.openxmlformats.org/officeDocument/2006/relationships" xmlns:p="http://schemas.openxmlformats.org/presentationml/2006/main">
+  <p:cSld>
+    <p:spTree>
+      <p:nvGrpSpPr>
+        <p:cNvPr id="1" name=""/>
+        <p:cNvGrpSpPr/>
+        <p:nvPr/>
+      </p:nvGrpSpPr>
+      <p:grpSpPr>
+        <a:xfrm>
+          <a:off x="0" y="0"/>
+          <a:ext cx="0" cy="0"/>
+          <a:chOff x="0" y="0"/>
+          <a:chExt cx="0" cy="0"/>
+        </a:xfrm>
+      </p:grpSpPr>
+      <p:sp>
+        <p:nvSpPr>
+          <p:cNvPr id="2" name="Title 1">
+            <a:extLst>
+              <a:ext uri="{FF2B5EF4-FFF2-40B4-BE49-F238E27FC236}">
+                <a16:creationId xmlns:a16="http://schemas.microsoft.com/office/drawing/2014/main" id="{3F1637CB-1BB5-1BF3-BB54-D48CCCE2689B}"/>
+              </a:ext>
+            </a:extLst>
+          </p:cNvPr>
+          <p:cNvSpPr>
+            <a:spLocks noGrp="1"/>
+          </p:cNvSpPr>
+          <p:nvPr>
+            <p:ph type="title"/>
+          </p:nvPr>
+        </p:nvSpPr>
+        <p:spPr/>
+        <p:txBody>
+          <a:bodyPr/>
+          <a:lstStyle/>
+          <a:p>
+            <a:r>
+              <a:rPr lang="en-GB" dirty="0"/>
+              <a:t>Quick recommendation before we start</a:t>
+            </a:r>
+          </a:p>
+        </p:txBody>
+      </p:sp>
+      <p:sp>
+        <p:nvSpPr>
+          <p:cNvPr id="3" name="Content Placeholder 2">
+            <a:extLst>
+              <a:ext uri="{FF2B5EF4-FFF2-40B4-BE49-F238E27FC236}">
+                <a16:creationId xmlns:a16="http://schemas.microsoft.com/office/drawing/2014/main" id="{6E2EE692-E268-A401-D457-C59824E93CFB}"/>
+              </a:ext>
+            </a:extLst>
+          </p:cNvPr>
+          <p:cNvSpPr>
+            <a:spLocks noGrp="1"/>
+          </p:cNvSpPr>
+          <p:nvPr>
+            <p:ph idx="1"/>
+          </p:nvPr>
+        </p:nvSpPr>
+        <p:spPr/>
+        <p:txBody>
+          <a:bodyPr>
+            <a:normAutofit fontScale="92500" lnSpcReduction="20000"/>
+          </a:bodyPr>
+          <a:lstStyle/>
+          <a:p>
+            <a:r>
+              <a:rPr lang="en-GB" dirty="0"/>
+              <a:t>I used </a:t>
+            </a:r>
+            <a:r>
+              <a:rPr lang="en-GB" dirty="0" err="1"/>
+              <a:t>Jetbrains</a:t>
+            </a:r>
+            <a:r>
+              <a:rPr lang="en-GB" dirty="0"/>
+              <a:t> Rider as my ide for this </a:t>
+            </a:r>
+          </a:p>
+          <a:p>
+            <a:endParaRPr lang="en-GB" dirty="0"/>
+          </a:p>
+          <a:p>
+            <a:r>
+              <a:rPr lang="en-GB" dirty="0"/>
+              <a:t>And it was leagues above any other ide’s that </a:t>
+            </a:r>
+            <a:r>
+              <a:rPr lang="en-GB" dirty="0" err="1"/>
+              <a:t>ive</a:t>
+            </a:r>
+            <a:r>
+              <a:rPr lang="en-GB" dirty="0"/>
+              <a:t> used so far.</a:t>
+            </a:r>
+          </a:p>
+          <a:p>
+            <a:endParaRPr lang="en-GB" dirty="0"/>
+          </a:p>
+          <a:p>
+            <a:r>
+              <a:rPr lang="en-GB" dirty="0"/>
+              <a:t>It actually has IntelliSense you can be confident in and also has IntelliSense for all the THREEjs symbols which was very useful.</a:t>
+            </a:r>
+          </a:p>
+          <a:p>
+            <a:endParaRPr lang="en-GB" dirty="0"/>
+          </a:p>
+          <a:p>
+            <a:r>
+              <a:rPr lang="en-GB" dirty="0"/>
+              <a:t>Its recently became free via a community licence but is also available to students </a:t>
+            </a:r>
+          </a:p>
+          <a:p>
+            <a:endParaRPr lang="en-GB" dirty="0"/>
+          </a:p>
+          <a:p>
+            <a:r>
+              <a:rPr lang="en-GB" dirty="0"/>
+              <a:t>So yeah… get rider its great!</a:t>
+            </a:r>
+          </a:p>
+        </p:txBody>
+      </p:sp>
+    </p:spTree>
+    <p:extLst>
+      <p:ext uri="{BB962C8B-B14F-4D97-AF65-F5344CB8AC3E}">
+        <p14:creationId xmlns:p14="http://schemas.microsoft.com/office/powerpoint/2010/main" val="2079870784"/>
+      </p:ext>
+    </p:extLst>
+  </p:cSld>
+  <p:clrMapOvr>
+    <a:masterClrMapping/>
+  </p:clrMapOvr>
+</p:sld>
+</file>
+
+<file path=ppt/slides/slide17.xml><?xml version="1.0" encoding="utf-8"?>
+<p:sld xmlns:a="http://schemas.openxmlformats.org/drawingml/2006/main" xmlns:r="http://schemas.openxmlformats.org/officeDocument/2006/relationships" xmlns:p="http://schemas.openxmlformats.org/presentationml/2006/main">
+  <p:cSld>
+    <p:spTree>
+      <p:nvGrpSpPr>
+        <p:cNvPr id="1" name=""/>
+        <p:cNvGrpSpPr/>
+        <p:nvPr/>
+      </p:nvGrpSpPr>
+      <p:grpSpPr>
+        <a:xfrm>
+          <a:off x="0" y="0"/>
+          <a:ext cx="0" cy="0"/>
+          <a:chOff x="0" y="0"/>
+          <a:chExt cx="0" cy="0"/>
+        </a:xfrm>
+      </p:grpSpPr>
+      <p:sp>
+        <p:nvSpPr>
+          <p:cNvPr id="2" name="Title 1">
+            <a:extLst>
+              <a:ext uri="{FF2B5EF4-FFF2-40B4-BE49-F238E27FC236}">
+                <a16:creationId xmlns:a16="http://schemas.microsoft.com/office/drawing/2014/main" id="{9E413F06-589E-58CB-DA4E-FEFD46FAB364}"/>
+              </a:ext>
+            </a:extLst>
+          </p:cNvPr>
+          <p:cNvSpPr>
+            <a:spLocks noGrp="1"/>
+          </p:cNvSpPr>
+          <p:nvPr>
+            <p:ph type="title"/>
+          </p:nvPr>
+        </p:nvSpPr>
+        <p:spPr/>
+        <p:txBody>
+          <a:bodyPr/>
+          <a:lstStyle/>
+          <a:p>
+            <a:r>
+              <a:rPr lang="en-GB" dirty="0"/>
+              <a:t>Demo Scene</a:t>
+            </a:r>
+          </a:p>
+        </p:txBody>
+      </p:sp>
+      <p:sp>
+        <p:nvSpPr>
+          <p:cNvPr id="3" name="Content Placeholder 2">
+            <a:extLst>
+              <a:ext uri="{FF2B5EF4-FFF2-40B4-BE49-F238E27FC236}">
+                <a16:creationId xmlns:a16="http://schemas.microsoft.com/office/drawing/2014/main" id="{485D3602-AA5B-65AF-3266-AD3C43373C11}"/>
+              </a:ext>
+            </a:extLst>
+          </p:cNvPr>
+          <p:cNvSpPr>
+            <a:spLocks noGrp="1"/>
+          </p:cNvSpPr>
+          <p:nvPr>
+            <p:ph idx="1"/>
+          </p:nvPr>
+        </p:nvSpPr>
+        <p:spPr/>
+        <p:txBody>
+          <a:bodyPr/>
+          <a:lstStyle/>
+          <a:p>
+            <a:endParaRPr lang="en-GB" dirty="0"/>
+          </a:p>
+        </p:txBody>
+      </p:sp>
+    </p:spTree>
+    <p:extLst>
+      <p:ext uri="{BB962C8B-B14F-4D97-AF65-F5344CB8AC3E}">
+        <p14:creationId xmlns:p14="http://schemas.microsoft.com/office/powerpoint/2010/main" val="3888701237"/>
+      </p:ext>
+    </p:extLst>
+  </p:cSld>
+  <p:clrMapOvr>
+    <a:masterClrMapping/>
+  </p:clrMapOvr>
+</p:sld>
+</file>
+
+<file path=ppt/slides/slide18.xml><?xml version="1.0" encoding="utf-8"?>
+<p:sld xmlns:a="http://schemas.openxmlformats.org/drawingml/2006/main" xmlns:r="http://schemas.openxmlformats.org/officeDocument/2006/relationships" xmlns:p="http://schemas.openxmlformats.org/presentationml/2006/main">
+  <p:cSld>
+    <p:spTree>
+      <p:nvGrpSpPr>
+        <p:cNvPr id="1" name=""/>
+        <p:cNvGrpSpPr/>
+        <p:nvPr/>
+      </p:nvGrpSpPr>
+      <p:grpSpPr>
+        <a:xfrm>
+          <a:off x="0" y="0"/>
+          <a:ext cx="0" cy="0"/>
+          <a:chOff x="0" y="0"/>
+          <a:chExt cx="0" cy="0"/>
+        </a:xfrm>
+      </p:grpSpPr>
+      <p:sp>
+        <p:nvSpPr>
+          <p:cNvPr id="2" name="Title 1">
+            <a:extLst>
+              <a:ext uri="{FF2B5EF4-FFF2-40B4-BE49-F238E27FC236}">
+                <a16:creationId xmlns:a16="http://schemas.microsoft.com/office/drawing/2014/main" id="{DDA13332-7F4B-48A4-3AF4-4DC747EBAE06}"/>
+              </a:ext>
+            </a:extLst>
+          </p:cNvPr>
+          <p:cNvSpPr>
+            <a:spLocks noGrp="1"/>
+          </p:cNvSpPr>
+          <p:nvPr>
+            <p:ph type="title"/>
+          </p:nvPr>
+        </p:nvSpPr>
+        <p:spPr/>
+        <p:txBody>
+          <a:bodyPr/>
+          <a:lstStyle/>
+          <a:p>
+            <a:r>
+              <a:rPr lang="en-GB" dirty="0"/>
+              <a:t>How it's made part 1 setting up the scene</a:t>
+            </a:r>
+          </a:p>
+        </p:txBody>
+      </p:sp>
+      <p:sp>
+        <p:nvSpPr>
+          <p:cNvPr id="3" name="Content Placeholder 2">
+            <a:extLst>
+              <a:ext uri="{FF2B5EF4-FFF2-40B4-BE49-F238E27FC236}">
+                <a16:creationId xmlns:a16="http://schemas.microsoft.com/office/drawing/2014/main" id="{C1139FF7-8747-7421-0EF4-81F246B8402D}"/>
+              </a:ext>
+            </a:extLst>
+          </p:cNvPr>
+          <p:cNvSpPr>
+            <a:spLocks noGrp="1"/>
+          </p:cNvSpPr>
+          <p:nvPr>
+            <p:ph idx="1"/>
+          </p:nvPr>
+        </p:nvSpPr>
+        <p:spPr/>
+        <p:txBody>
+          <a:bodyPr/>
+          <a:lstStyle/>
+          <a:p>
+            <a:endParaRPr lang="en-GB" dirty="0"/>
+          </a:p>
+        </p:txBody>
+      </p:sp>
+    </p:spTree>
+    <p:extLst>
+      <p:ext uri="{BB962C8B-B14F-4D97-AF65-F5344CB8AC3E}">
+        <p14:creationId xmlns:p14="http://schemas.microsoft.com/office/powerpoint/2010/main" val="1790972422"/>
+      </p:ext>
+    </p:extLst>
+  </p:cSld>
+  <p:clrMapOvr>
+    <a:masterClrMapping/>
+  </p:clrMapOvr>
+</p:sld>
+</file>
+
+<file path=ppt/slides/slide19.xml><?xml version="1.0" encoding="utf-8"?>
+<p:sld xmlns:a="http://schemas.openxmlformats.org/drawingml/2006/main" xmlns:r="http://schemas.openxmlformats.org/officeDocument/2006/relationships" xmlns:p="http://schemas.openxmlformats.org/presentationml/2006/main">
+  <p:cSld>
+    <p:spTree>
+      <p:nvGrpSpPr>
+        <p:cNvPr id="1" name=""/>
+        <p:cNvGrpSpPr/>
+        <p:nvPr/>
+      </p:nvGrpSpPr>
+      <p:grpSpPr>
+        <a:xfrm>
+          <a:off x="0" y="0"/>
+          <a:ext cx="0" cy="0"/>
+          <a:chOff x="0" y="0"/>
+          <a:chExt cx="0" cy="0"/>
+        </a:xfrm>
+      </p:grpSpPr>
+      <p:sp>
+        <p:nvSpPr>
+          <p:cNvPr id="2" name="Title 1">
+            <a:extLst>
+              <a:ext uri="{FF2B5EF4-FFF2-40B4-BE49-F238E27FC236}">
+                <a16:creationId xmlns:a16="http://schemas.microsoft.com/office/drawing/2014/main" id="{B8F0AA5A-CEDA-407F-98BC-FD501E15C3A0}"/>
+              </a:ext>
+            </a:extLst>
+          </p:cNvPr>
+          <p:cNvSpPr>
+            <a:spLocks noGrp="1"/>
+          </p:cNvSpPr>
+          <p:nvPr>
+            <p:ph type="title"/>
+          </p:nvPr>
+        </p:nvSpPr>
+        <p:spPr/>
+        <p:txBody>
+          <a:bodyPr/>
+          <a:lstStyle/>
+          <a:p>
+            <a:endParaRPr lang="en-GB" dirty="0"/>
+          </a:p>
+        </p:txBody>
+      </p:sp>
+      <p:sp>
+        <p:nvSpPr>
+          <p:cNvPr id="3" name="Content Placeholder 2">
+            <a:extLst>
+              <a:ext uri="{FF2B5EF4-FFF2-40B4-BE49-F238E27FC236}">
+                <a16:creationId xmlns:a16="http://schemas.microsoft.com/office/drawing/2014/main" id="{6DAFBEAF-9171-431F-8E81-746B2184F184}"/>
+              </a:ext>
+            </a:extLst>
+          </p:cNvPr>
+          <p:cNvSpPr>
+            <a:spLocks noGrp="1"/>
+          </p:cNvSpPr>
+          <p:nvPr>
+            <p:ph idx="1"/>
+          </p:nvPr>
+        </p:nvSpPr>
+        <p:spPr/>
+        <p:txBody>
+          <a:bodyPr/>
+          <a:lstStyle/>
+          <a:p>
+            <a:endParaRPr lang="en-GB"/>
+          </a:p>
+        </p:txBody>
+      </p:sp>
+    </p:spTree>
+    <p:extLst>
+      <p:ext uri="{BB962C8B-B14F-4D97-AF65-F5344CB8AC3E}">
+        <p14:creationId xmlns:p14="http://schemas.microsoft.com/office/powerpoint/2010/main" val="1624693926"/>
+      </p:ext>
+    </p:extLst>
+  </p:cSld>
+  <p:clrMapOvr>
+    <a:masterClrMapping/>
+  </p:clrMapOvr>
+</p:sld>
+</file>
+
 <file path=ppt/slides/slide2.xml><?xml version="1.0" encoding="utf-8"?>
 <p:sld xmlns:a="http://schemas.openxmlformats.org/drawingml/2006/main" xmlns:r="http://schemas.openxmlformats.org/officeDocument/2006/relationships" xmlns:p="http://schemas.openxmlformats.org/presentationml/2006/main">
   <p:cSld>
@@ -3727,7 +5255,7 @@
           <p:cNvPr id="2" name="Title 1">
             <a:extLst>
               <a:ext uri="{FF2B5EF4-FFF2-40B4-BE49-F238E27FC236}">
-                <a16:creationId xmlns:a16="http://schemas.microsoft.com/office/drawing/2014/main" id="{9E413F06-589E-58CB-DA4E-FEFD46FAB364}"/>
+                <a16:creationId xmlns:a16="http://schemas.microsoft.com/office/drawing/2014/main" id="{41D129F1-B5B0-E797-8313-ADAFE9F17949}"/>
               </a:ext>
             </a:extLst>
           </p:cNvPr>
@@ -3745,7 +5273,7 @@
           <a:p>
             <a:r>
               <a:rPr lang="en-GB" dirty="0"/>
-              <a:t>Demo Scene</a:t>
+              <a:t>80 / 20 rule</a:t>
             </a:r>
           </a:p>
         </p:txBody>
@@ -3755,7 +5283,7 @@
           <p:cNvPr id="3" name="Content Placeholder 2">
             <a:extLst>
               <a:ext uri="{FF2B5EF4-FFF2-40B4-BE49-F238E27FC236}">
-                <a16:creationId xmlns:a16="http://schemas.microsoft.com/office/drawing/2014/main" id="{485D3602-AA5B-65AF-3266-AD3C43373C11}"/>
+                <a16:creationId xmlns:a16="http://schemas.microsoft.com/office/drawing/2014/main" id="{3AD45EF2-29E2-C3C7-7A27-72B68F889B1A}"/>
               </a:ext>
             </a:extLst>
           </p:cNvPr>
@@ -3771,14 +5299,35 @@
           <a:bodyPr/>
           <a:lstStyle/>
           <a:p>
+            <a:r>
+              <a:rPr lang="en-GB" dirty="0"/>
+              <a:t>The 80 / 20 rule states that 80% of outcomes come from 20% of causes. </a:t>
+            </a:r>
+          </a:p>
+          <a:p>
             <a:endParaRPr lang="en-GB" dirty="0"/>
+          </a:p>
+          <a:p>
+            <a:r>
+              <a:rPr lang="en-GB" dirty="0"/>
+              <a:t>In the case of socket io there is just a few functions (20%) that are used very commonly across the project (80%). So if you can know these few functions you will have enough knowledge to create a multiplayer game.</a:t>
+            </a:r>
+          </a:p>
+          <a:p>
+            <a:endParaRPr lang="en-GB" dirty="0"/>
+          </a:p>
+          <a:p>
+            <a:r>
+              <a:rPr lang="en-GB" dirty="0"/>
+              <a:t>So what are these functions?</a:t>
+            </a:r>
           </a:p>
         </p:txBody>
       </p:sp>
     </p:spTree>
     <p:extLst>
       <p:ext uri="{BB962C8B-B14F-4D97-AF65-F5344CB8AC3E}">
-        <p14:creationId xmlns:p14="http://schemas.microsoft.com/office/powerpoint/2010/main" val="3888701237"/>
+        <p14:creationId xmlns:p14="http://schemas.microsoft.com/office/powerpoint/2010/main" val="1823427930"/>
       </p:ext>
     </p:extLst>
   </p:cSld>
@@ -3810,7 +5359,7 @@
           <p:cNvPr id="2" name="Title 1">
             <a:extLst>
               <a:ext uri="{FF2B5EF4-FFF2-40B4-BE49-F238E27FC236}">
-                <a16:creationId xmlns:a16="http://schemas.microsoft.com/office/drawing/2014/main" id="{DDA13332-7F4B-48A4-3AF4-4DC747EBAE06}"/>
+                <a16:creationId xmlns:a16="http://schemas.microsoft.com/office/drawing/2014/main" id="{1E9BBD1C-8F9C-0F2C-117A-80E1D0B78035}"/>
               </a:ext>
             </a:extLst>
           </p:cNvPr>
@@ -3828,11 +5377,7 @@
           <a:p>
             <a:r>
               <a:rPr lang="en-GB" dirty="0"/>
-              <a:t>How its made part 1 setting up </a:t>
-            </a:r>
-            <a:r>
-              <a:rPr lang="en-GB"/>
-              <a:t>the scene</a:t>
+              <a:t>Client Functions</a:t>
             </a:r>
           </a:p>
         </p:txBody>
@@ -3842,7 +5387,7 @@
           <p:cNvPr id="3" name="Content Placeholder 2">
             <a:extLst>
               <a:ext uri="{FF2B5EF4-FFF2-40B4-BE49-F238E27FC236}">
-                <a16:creationId xmlns:a16="http://schemas.microsoft.com/office/drawing/2014/main" id="{C1139FF7-8747-7421-0EF4-81F246B8402D}"/>
+                <a16:creationId xmlns:a16="http://schemas.microsoft.com/office/drawing/2014/main" id="{AA08B15F-BA8F-89B0-1EEE-BF1F9281148E}"/>
               </a:ext>
             </a:extLst>
           </p:cNvPr>
@@ -3865,7 +5410,414 @@
     </p:spTree>
     <p:extLst>
       <p:ext uri="{BB962C8B-B14F-4D97-AF65-F5344CB8AC3E}">
-        <p14:creationId xmlns:p14="http://schemas.microsoft.com/office/powerpoint/2010/main" val="1790972422"/>
+        <p14:creationId xmlns:p14="http://schemas.microsoft.com/office/powerpoint/2010/main" val="1234129962"/>
+      </p:ext>
+    </p:extLst>
+  </p:cSld>
+  <p:clrMapOvr>
+    <a:masterClrMapping/>
+  </p:clrMapOvr>
+</p:sld>
+</file>
+
+<file path=ppt/slides/slide7.xml><?xml version="1.0" encoding="utf-8"?>
+<p:sld xmlns:a="http://schemas.openxmlformats.org/drawingml/2006/main" xmlns:r="http://schemas.openxmlformats.org/officeDocument/2006/relationships" xmlns:p="http://schemas.openxmlformats.org/presentationml/2006/main">
+  <p:cSld>
+    <p:spTree>
+      <p:nvGrpSpPr>
+        <p:cNvPr id="1" name=""/>
+        <p:cNvGrpSpPr/>
+        <p:nvPr/>
+      </p:nvGrpSpPr>
+      <p:grpSpPr>
+        <a:xfrm>
+          <a:off x="0" y="0"/>
+          <a:ext cx="0" cy="0"/>
+          <a:chOff x="0" y="0"/>
+          <a:chExt cx="0" cy="0"/>
+        </a:xfrm>
+      </p:grpSpPr>
+      <p:sp>
+        <p:nvSpPr>
+          <p:cNvPr id="2" name="Title 1">
+            <a:extLst>
+              <a:ext uri="{FF2B5EF4-FFF2-40B4-BE49-F238E27FC236}">
+                <a16:creationId xmlns:a16="http://schemas.microsoft.com/office/drawing/2014/main" id="{C503072F-BBFC-FB2E-784B-F8BE5D7E0330}"/>
+              </a:ext>
+            </a:extLst>
+          </p:cNvPr>
+          <p:cNvSpPr>
+            <a:spLocks noGrp="1"/>
+          </p:cNvSpPr>
+          <p:nvPr>
+            <p:ph type="title"/>
+          </p:nvPr>
+        </p:nvSpPr>
+        <p:spPr/>
+        <p:txBody>
+          <a:bodyPr/>
+          <a:lstStyle/>
+          <a:p>
+            <a:endParaRPr lang="en-GB"/>
+          </a:p>
+        </p:txBody>
+      </p:sp>
+      <p:pic>
+        <p:nvPicPr>
+          <p:cNvPr id="5" name="Content Placeholder 4" descr="A screen shot of a computer&#10;&#10;Description automatically generated">
+            <a:extLst>
+              <a:ext uri="{FF2B5EF4-FFF2-40B4-BE49-F238E27FC236}">
+                <a16:creationId xmlns:a16="http://schemas.microsoft.com/office/drawing/2014/main" id="{956069E5-C506-36C6-5A59-9B8C715EA191}"/>
+              </a:ext>
+            </a:extLst>
+          </p:cNvPr>
+          <p:cNvPicPr>
+            <a:picLocks noGrp="1" noChangeAspect="1"/>
+          </p:cNvPicPr>
+          <p:nvPr>
+            <p:ph idx="1"/>
+          </p:nvPr>
+        </p:nvPicPr>
+        <p:blipFill>
+          <a:blip r:embed="rId2">
+            <a:extLst>
+              <a:ext uri="{28A0092B-C50C-407E-A947-70E740481C1C}">
+                <a14:useLocalDpi xmlns:a14="http://schemas.microsoft.com/office/drawing/2010/main" val="0"/>
+              </a:ext>
+            </a:extLst>
+          </a:blip>
+          <a:stretch>
+            <a:fillRect/>
+          </a:stretch>
+        </p:blipFill>
+        <p:spPr>
+          <a:xfrm>
+            <a:off x="3066330" y="1825625"/>
+            <a:ext cx="6059339" cy="4351338"/>
+          </a:xfrm>
+        </p:spPr>
+      </p:pic>
+      <p:sp>
+        <p:nvSpPr>
+          <p:cNvPr id="6" name="TextBox 5">
+            <a:extLst>
+              <a:ext uri="{FF2B5EF4-FFF2-40B4-BE49-F238E27FC236}">
+                <a16:creationId xmlns:a16="http://schemas.microsoft.com/office/drawing/2014/main" id="{61EE04AD-39B4-92F8-7549-E94EA39762E6}"/>
+              </a:ext>
+            </a:extLst>
+          </p:cNvPr>
+          <p:cNvSpPr txBox="1"/>
+          <p:nvPr/>
+        </p:nvSpPr>
+        <p:spPr>
+          <a:xfrm>
+            <a:off x="176980" y="1825625"/>
+            <a:ext cx="5466735" cy="646331"/>
+          </a:xfrm>
+          <a:prstGeom prst="rect">
+            <a:avLst/>
+          </a:prstGeom>
+          <a:noFill/>
+        </p:spPr>
+        <p:txBody>
+          <a:bodyPr wrap="square" rtlCol="0">
+            <a:spAutoFit/>
+          </a:bodyPr>
+          <a:lstStyle/>
+          <a:p>
+            <a:r>
+              <a:rPr lang="en-GB" dirty="0"/>
+              <a:t>Assume socket here is an object accessible from this scope</a:t>
+            </a:r>
+          </a:p>
+        </p:txBody>
+      </p:sp>
+      <p:sp>
+        <p:nvSpPr>
+          <p:cNvPr id="7" name="TextBox 6">
+            <a:extLst>
+              <a:ext uri="{FF2B5EF4-FFF2-40B4-BE49-F238E27FC236}">
+                <a16:creationId xmlns:a16="http://schemas.microsoft.com/office/drawing/2014/main" id="{637A8BD1-BFC1-D7A0-4F51-3C8136DED1BF}"/>
+              </a:ext>
+            </a:extLst>
+          </p:cNvPr>
+          <p:cNvSpPr txBox="1"/>
+          <p:nvPr/>
+        </p:nvSpPr>
+        <p:spPr>
+          <a:xfrm>
+            <a:off x="6548284" y="6123543"/>
+            <a:ext cx="5466735" cy="369332"/>
+          </a:xfrm>
+          <a:prstGeom prst="rect">
+            <a:avLst/>
+          </a:prstGeom>
+          <a:noFill/>
+        </p:spPr>
+        <p:txBody>
+          <a:bodyPr wrap="square" rtlCol="0">
+            <a:spAutoFit/>
+          </a:bodyPr>
+          <a:lstStyle/>
+          <a:p>
+            <a:r>
+              <a:rPr lang="en-GB" dirty="0"/>
+              <a:t>This is how to react to messages from the server</a:t>
+            </a:r>
+          </a:p>
+        </p:txBody>
+      </p:sp>
+    </p:spTree>
+    <p:extLst>
+      <p:ext uri="{BB962C8B-B14F-4D97-AF65-F5344CB8AC3E}">
+        <p14:creationId xmlns:p14="http://schemas.microsoft.com/office/powerpoint/2010/main" val="870548848"/>
+      </p:ext>
+    </p:extLst>
+  </p:cSld>
+  <p:clrMapOvr>
+    <a:masterClrMapping/>
+  </p:clrMapOvr>
+</p:sld>
+</file>
+
+<file path=ppt/slides/slide8.xml><?xml version="1.0" encoding="utf-8"?>
+<p:sld xmlns:a="http://schemas.openxmlformats.org/drawingml/2006/main" xmlns:r="http://schemas.openxmlformats.org/officeDocument/2006/relationships" xmlns:p="http://schemas.openxmlformats.org/presentationml/2006/main">
+  <p:cSld>
+    <p:spTree>
+      <p:nvGrpSpPr>
+        <p:cNvPr id="1" name=""/>
+        <p:cNvGrpSpPr/>
+        <p:nvPr/>
+      </p:nvGrpSpPr>
+      <p:grpSpPr>
+        <a:xfrm>
+          <a:off x="0" y="0"/>
+          <a:ext cx="0" cy="0"/>
+          <a:chOff x="0" y="0"/>
+          <a:chExt cx="0" cy="0"/>
+        </a:xfrm>
+      </p:grpSpPr>
+      <p:sp>
+        <p:nvSpPr>
+          <p:cNvPr id="2" name="Title 1">
+            <a:extLst>
+              <a:ext uri="{FF2B5EF4-FFF2-40B4-BE49-F238E27FC236}">
+                <a16:creationId xmlns:a16="http://schemas.microsoft.com/office/drawing/2014/main" id="{FEE3F9A9-A46B-4632-D868-D09F174C0CAF}"/>
+              </a:ext>
+            </a:extLst>
+          </p:cNvPr>
+          <p:cNvSpPr>
+            <a:spLocks noGrp="1"/>
+          </p:cNvSpPr>
+          <p:nvPr>
+            <p:ph type="title"/>
+          </p:nvPr>
+        </p:nvSpPr>
+        <p:spPr/>
+        <p:txBody>
+          <a:bodyPr/>
+          <a:lstStyle/>
+          <a:p>
+            <a:endParaRPr lang="en-GB"/>
+          </a:p>
+        </p:txBody>
+      </p:sp>
+      <p:sp>
+        <p:nvSpPr>
+          <p:cNvPr id="4" name="TextBox 3">
+            <a:extLst>
+              <a:ext uri="{FF2B5EF4-FFF2-40B4-BE49-F238E27FC236}">
+                <a16:creationId xmlns:a16="http://schemas.microsoft.com/office/drawing/2014/main" id="{384DB9AC-20EC-25FA-00DC-E69419D69758}"/>
+              </a:ext>
+            </a:extLst>
+          </p:cNvPr>
+          <p:cNvSpPr txBox="1"/>
+          <p:nvPr/>
+        </p:nvSpPr>
+        <p:spPr>
+          <a:xfrm>
+            <a:off x="176980" y="1825625"/>
+            <a:ext cx="5466735" cy="646331"/>
+          </a:xfrm>
+          <a:prstGeom prst="rect">
+            <a:avLst/>
+          </a:prstGeom>
+          <a:noFill/>
+        </p:spPr>
+        <p:txBody>
+          <a:bodyPr wrap="square" rtlCol="0">
+            <a:spAutoFit/>
+          </a:bodyPr>
+          <a:lstStyle/>
+          <a:p>
+            <a:r>
+              <a:rPr lang="en-GB" dirty="0"/>
+              <a:t>Assume socket here is an object accessible from this scope</a:t>
+            </a:r>
+          </a:p>
+        </p:txBody>
+      </p:sp>
+      <p:sp>
+        <p:nvSpPr>
+          <p:cNvPr id="5" name="TextBox 4">
+            <a:extLst>
+              <a:ext uri="{FF2B5EF4-FFF2-40B4-BE49-F238E27FC236}">
+                <a16:creationId xmlns:a16="http://schemas.microsoft.com/office/drawing/2014/main" id="{CBCD70F5-A5C3-9C86-DD08-62064AF5F8DD}"/>
+              </a:ext>
+            </a:extLst>
+          </p:cNvPr>
+          <p:cNvSpPr txBox="1"/>
+          <p:nvPr/>
+        </p:nvSpPr>
+        <p:spPr>
+          <a:xfrm>
+            <a:off x="6548284" y="6123543"/>
+            <a:ext cx="5466735" cy="369332"/>
+          </a:xfrm>
+          <a:prstGeom prst="rect">
+            <a:avLst/>
+          </a:prstGeom>
+          <a:noFill/>
+        </p:spPr>
+        <p:txBody>
+          <a:bodyPr wrap="square" rtlCol="0">
+            <a:spAutoFit/>
+          </a:bodyPr>
+          <a:lstStyle/>
+          <a:p>
+            <a:r>
+              <a:rPr lang="en-GB" dirty="0"/>
+              <a:t>This is how to send messages to the server</a:t>
+            </a:r>
+          </a:p>
+        </p:txBody>
+      </p:sp>
+      <p:pic>
+        <p:nvPicPr>
+          <p:cNvPr id="7" name="Picture 6" descr="A screenshot of a computer program&#10;&#10;Description automatically generated">
+            <a:extLst>
+              <a:ext uri="{FF2B5EF4-FFF2-40B4-BE49-F238E27FC236}">
+                <a16:creationId xmlns:a16="http://schemas.microsoft.com/office/drawing/2014/main" id="{D60DCB8A-DDAC-4F68-BA98-F4D25B333DD5}"/>
+              </a:ext>
+            </a:extLst>
+          </p:cNvPr>
+          <p:cNvPicPr>
+            <a:picLocks noChangeAspect="1"/>
+          </p:cNvPicPr>
+          <p:nvPr/>
+        </p:nvPicPr>
+        <p:blipFill>
+          <a:blip r:embed="rId2">
+            <a:extLst>
+              <a:ext uri="{28A0092B-C50C-407E-A947-70E740481C1C}">
+                <a14:useLocalDpi xmlns:a14="http://schemas.microsoft.com/office/drawing/2010/main" val="0"/>
+              </a:ext>
+            </a:extLst>
+          </a:blip>
+          <a:stretch>
+            <a:fillRect/>
+          </a:stretch>
+        </p:blipFill>
+        <p:spPr>
+          <a:xfrm>
+            <a:off x="2745351" y="2076655"/>
+            <a:ext cx="6701298" cy="4046888"/>
+          </a:xfrm>
+          <a:prstGeom prst="rect">
+            <a:avLst/>
+          </a:prstGeom>
+        </p:spPr>
+      </p:pic>
+    </p:spTree>
+    <p:extLst>
+      <p:ext uri="{BB962C8B-B14F-4D97-AF65-F5344CB8AC3E}">
+        <p14:creationId xmlns:p14="http://schemas.microsoft.com/office/powerpoint/2010/main" val="4023177034"/>
+      </p:ext>
+    </p:extLst>
+  </p:cSld>
+  <p:clrMapOvr>
+    <a:masterClrMapping/>
+  </p:clrMapOvr>
+</p:sld>
+</file>
+
+<file path=ppt/slides/slide9.xml><?xml version="1.0" encoding="utf-8"?>
+<p:sld xmlns:a="http://schemas.openxmlformats.org/drawingml/2006/main" xmlns:r="http://schemas.openxmlformats.org/officeDocument/2006/relationships" xmlns:p="http://schemas.openxmlformats.org/presentationml/2006/main">
+  <p:cSld>
+    <p:spTree>
+      <p:nvGrpSpPr>
+        <p:cNvPr id="1" name=""/>
+        <p:cNvGrpSpPr/>
+        <p:nvPr/>
+      </p:nvGrpSpPr>
+      <p:grpSpPr>
+        <a:xfrm>
+          <a:off x="0" y="0"/>
+          <a:ext cx="0" cy="0"/>
+          <a:chOff x="0" y="0"/>
+          <a:chExt cx="0" cy="0"/>
+        </a:xfrm>
+      </p:grpSpPr>
+      <p:sp>
+        <p:nvSpPr>
+          <p:cNvPr id="2" name="Title 1">
+            <a:extLst>
+              <a:ext uri="{FF2B5EF4-FFF2-40B4-BE49-F238E27FC236}">
+                <a16:creationId xmlns:a16="http://schemas.microsoft.com/office/drawing/2014/main" id="{825C3F41-5B2F-A9E3-B73B-BCA7488B380C}"/>
+              </a:ext>
+            </a:extLst>
+          </p:cNvPr>
+          <p:cNvSpPr>
+            <a:spLocks noGrp="1"/>
+          </p:cNvSpPr>
+          <p:nvPr>
+            <p:ph type="title"/>
+          </p:nvPr>
+        </p:nvSpPr>
+        <p:spPr/>
+        <p:txBody>
+          <a:bodyPr/>
+          <a:lstStyle/>
+          <a:p>
+            <a:r>
+              <a:rPr lang="en-GB" dirty="0"/>
+              <a:t>THAT’S IT!</a:t>
+            </a:r>
+          </a:p>
+        </p:txBody>
+      </p:sp>
+      <p:sp>
+        <p:nvSpPr>
+          <p:cNvPr id="3" name="Content Placeholder 2">
+            <a:extLst>
+              <a:ext uri="{FF2B5EF4-FFF2-40B4-BE49-F238E27FC236}">
+                <a16:creationId xmlns:a16="http://schemas.microsoft.com/office/drawing/2014/main" id="{C087EA28-7BF4-2D4C-F52A-6BA43D09BE46}"/>
+              </a:ext>
+            </a:extLst>
+          </p:cNvPr>
+          <p:cNvSpPr>
+            <a:spLocks noGrp="1"/>
+          </p:cNvSpPr>
+          <p:nvPr>
+            <p:ph idx="1"/>
+          </p:nvPr>
+        </p:nvSpPr>
+        <p:spPr/>
+        <p:txBody>
+          <a:bodyPr/>
+          <a:lstStyle/>
+          <a:p>
+            <a:r>
+              <a:rPr lang="en-GB" dirty="0"/>
+              <a:t>For your client’s code at least</a:t>
+            </a:r>
+          </a:p>
+        </p:txBody>
+      </p:sp>
+    </p:spTree>
+    <p:extLst>
+      <p:ext uri="{BB962C8B-B14F-4D97-AF65-F5344CB8AC3E}">
+        <p14:creationId xmlns:p14="http://schemas.microsoft.com/office/powerpoint/2010/main" val="441643911"/>
       </p:ext>
     </p:extLst>
   </p:cSld>
@@ -4188,4 +6140,319 @@
     </a:ext>
   </a:extLst>
 </a:theme>
+</file>
+
+<file path=ppt/theme/theme2.xml><?xml version="1.0" encoding="utf-8"?>
+<a:theme xmlns:a="http://schemas.openxmlformats.org/drawingml/2006/main" name="Office Theme">
+  <a:themeElements>
+    <a:clrScheme name="Office">
+      <a:dk1>
+        <a:sysClr val="windowText" lastClr="000000"/>
+      </a:dk1>
+      <a:lt1>
+        <a:sysClr val="window" lastClr="FFFFFF"/>
+      </a:lt1>
+      <a:dk2>
+        <a:srgbClr val="0E2841"/>
+      </a:dk2>
+      <a:lt2>
+        <a:srgbClr val="E8E8E8"/>
+      </a:lt2>
+      <a:accent1>
+        <a:srgbClr val="156082"/>
+      </a:accent1>
+      <a:accent2>
+        <a:srgbClr val="E97132"/>
+      </a:accent2>
+      <a:accent3>
+        <a:srgbClr val="196B24"/>
+      </a:accent3>
+      <a:accent4>
+        <a:srgbClr val="0F9ED5"/>
+      </a:accent4>
+      <a:accent5>
+        <a:srgbClr val="A02B93"/>
+      </a:accent5>
+      <a:accent6>
+        <a:srgbClr val="4EA72E"/>
+      </a:accent6>
+      <a:hlink>
+        <a:srgbClr val="467886"/>
+      </a:hlink>
+      <a:folHlink>
+        <a:srgbClr val="96607D"/>
+      </a:folHlink>
+    </a:clrScheme>
+    <a:fontScheme name="Office">
+      <a:majorFont>
+        <a:latin typeface="Aptos Display" panose="02110004020202020204"/>
+        <a:ea typeface=""/>
+        <a:cs typeface=""/>
+        <a:font script="Jpan" typeface="游ゴシック Light"/>
+        <a:font script="Hang" typeface="맑은 고딕"/>
+        <a:font script="Hans" typeface="等线 Light"/>
+        <a:font script="Hant" typeface="新細明體"/>
+        <a:font script="Arab" typeface="Times New Roman"/>
+        <a:font script="Hebr" typeface="Times New Roman"/>
+        <a:font script="Thai" typeface="Angsana New"/>
+        <a:font script="Ethi" typeface="Nyala"/>
+        <a:font script="Beng" typeface="Vrinda"/>
+        <a:font script="Gujr" typeface="Shruti"/>
+        <a:font script="Khmr" typeface="MoolBoran"/>
+        <a:font script="Knda" typeface="Tunga"/>
+        <a:font script="Guru" typeface="Raavi"/>
+        <a:font script="Cans" typeface="Euphemia"/>
+        <a:font script="Cher" typeface="Plantagenet Cherokee"/>
+        <a:font script="Yiii" typeface="Microsoft Yi Baiti"/>
+        <a:font script="Tibt" typeface="Microsoft Himalaya"/>
+        <a:font script="Thaa" typeface="MV Boli"/>
+        <a:font script="Deva" typeface="Mangal"/>
+        <a:font script="Telu" typeface="Gautami"/>
+        <a:font script="Taml" typeface="Latha"/>
+        <a:font script="Syrc" typeface="Estrangelo Edessa"/>
+        <a:font script="Orya" typeface="Kalinga"/>
+        <a:font script="Mlym" typeface="Kartika"/>
+        <a:font script="Laoo" typeface="DokChampa"/>
+        <a:font script="Sinh" typeface="Iskoola Pota"/>
+        <a:font script="Mong" typeface="Mongolian Baiti"/>
+        <a:font script="Viet" typeface="Times New Roman"/>
+        <a:font script="Uigh" typeface="Microsoft Uighur"/>
+        <a:font script="Geor" typeface="Sylfaen"/>
+        <a:font script="Armn" typeface="Arial"/>
+        <a:font script="Bugi" typeface="Leelawadee UI"/>
+        <a:font script="Bopo" typeface="Microsoft JhengHei"/>
+        <a:font script="Java" typeface="Javanese Text"/>
+        <a:font script="Lisu" typeface="Segoe UI"/>
+        <a:font script="Mymr" typeface="Myanmar Text"/>
+        <a:font script="Nkoo" typeface="Ebrima"/>
+        <a:font script="Olck" typeface="Nirmala UI"/>
+        <a:font script="Osma" typeface="Ebrima"/>
+        <a:font script="Phag" typeface="Phagspa"/>
+        <a:font script="Syrn" typeface="Estrangelo Edessa"/>
+        <a:font script="Syrj" typeface="Estrangelo Edessa"/>
+        <a:font script="Syre" typeface="Estrangelo Edessa"/>
+        <a:font script="Sora" typeface="Nirmala UI"/>
+        <a:font script="Tale" typeface="Microsoft Tai Le"/>
+        <a:font script="Talu" typeface="Microsoft New Tai Lue"/>
+        <a:font script="Tfng" typeface="Ebrima"/>
+      </a:majorFont>
+      <a:minorFont>
+        <a:latin typeface="Aptos" panose="02110004020202020204"/>
+        <a:ea typeface=""/>
+        <a:cs typeface=""/>
+        <a:font script="Jpan" typeface="游ゴシック"/>
+        <a:font script="Hang" typeface="맑은 고딕"/>
+        <a:font script="Hans" typeface="等线"/>
+        <a:font script="Hant" typeface="新細明體"/>
+        <a:font script="Arab" typeface="Arial"/>
+        <a:font script="Hebr" typeface="Arial"/>
+        <a:font script="Thai" typeface="Cordia New"/>
+        <a:font script="Ethi" typeface="Nyala"/>
+        <a:font script="Beng" typeface="Vrinda"/>
+        <a:font script="Gujr" typeface="Shruti"/>
+        <a:font script="Khmr" typeface="DaunPenh"/>
+        <a:font script="Knda" typeface="Tunga"/>
+        <a:font script="Guru" typeface="Raavi"/>
+        <a:font script="Cans" typeface="Euphemia"/>
+        <a:font script="Cher" typeface="Plantagenet Cherokee"/>
+        <a:font script="Yiii" typeface="Microsoft Yi Baiti"/>
+        <a:font script="Tibt" typeface="Microsoft Himalaya"/>
+        <a:font script="Thaa" typeface="MV Boli"/>
+        <a:font script="Deva" typeface="Mangal"/>
+        <a:font script="Telu" typeface="Gautami"/>
+        <a:font script="Taml" typeface="Latha"/>
+        <a:font script="Syrc" typeface="Estrangelo Edessa"/>
+        <a:font script="Orya" typeface="Kalinga"/>
+        <a:font script="Mlym" typeface="Kartika"/>
+        <a:font script="Laoo" typeface="DokChampa"/>
+        <a:font script="Sinh" typeface="Iskoola Pota"/>
+        <a:font script="Mong" typeface="Mongolian Baiti"/>
+        <a:font script="Viet" typeface="Arial"/>
+        <a:font script="Uigh" typeface="Microsoft Uighur"/>
+        <a:font script="Geor" typeface="Sylfaen"/>
+        <a:font script="Armn" typeface="Arial"/>
+        <a:font script="Bugi" typeface="Leelawadee UI"/>
+        <a:font script="Bopo" typeface="Microsoft JhengHei"/>
+        <a:font script="Java" typeface="Javanese Text"/>
+        <a:font script="Lisu" typeface="Segoe UI"/>
+        <a:font script="Mymr" typeface="Myanmar Text"/>
+        <a:font script="Nkoo" typeface="Ebrima"/>
+        <a:font script="Olck" typeface="Nirmala UI"/>
+        <a:font script="Osma" typeface="Ebrima"/>
+        <a:font script="Phag" typeface="Phagspa"/>
+        <a:font script="Syrn" typeface="Estrangelo Edessa"/>
+        <a:font script="Syrj" typeface="Estrangelo Edessa"/>
+        <a:font script="Syre" typeface="Estrangelo Edessa"/>
+        <a:font script="Sora" typeface="Nirmala UI"/>
+        <a:font script="Tale" typeface="Microsoft Tai Le"/>
+        <a:font script="Talu" typeface="Microsoft New Tai Lue"/>
+        <a:font script="Tfng" typeface="Ebrima"/>
+      </a:minorFont>
+    </a:fontScheme>
+    <a:fmtScheme name="Office">
+      <a:fillStyleLst>
+        <a:solidFill>
+          <a:schemeClr val="phClr"/>
+        </a:solidFill>
+        <a:gradFill rotWithShape="1">
+          <a:gsLst>
+            <a:gs pos="0">
+              <a:schemeClr val="phClr">
+                <a:lumMod val="110000"/>
+                <a:satMod val="105000"/>
+                <a:tint val="67000"/>
+              </a:schemeClr>
+            </a:gs>
+            <a:gs pos="50000">
+              <a:schemeClr val="phClr">
+                <a:lumMod val="105000"/>
+                <a:satMod val="103000"/>
+                <a:tint val="73000"/>
+              </a:schemeClr>
+            </a:gs>
+            <a:gs pos="100000">
+              <a:schemeClr val="phClr">
+                <a:lumMod val="105000"/>
+                <a:satMod val="109000"/>
+                <a:tint val="81000"/>
+              </a:schemeClr>
+            </a:gs>
+          </a:gsLst>
+          <a:lin ang="5400000" scaled="0"/>
+        </a:gradFill>
+        <a:gradFill rotWithShape="1">
+          <a:gsLst>
+            <a:gs pos="0">
+              <a:schemeClr val="phClr">
+                <a:satMod val="103000"/>
+                <a:lumMod val="102000"/>
+                <a:tint val="94000"/>
+              </a:schemeClr>
+            </a:gs>
+            <a:gs pos="50000">
+              <a:schemeClr val="phClr">
+                <a:satMod val="110000"/>
+                <a:lumMod val="100000"/>
+                <a:shade val="100000"/>
+              </a:schemeClr>
+            </a:gs>
+            <a:gs pos="100000">
+              <a:schemeClr val="phClr">
+                <a:lumMod val="99000"/>
+                <a:satMod val="120000"/>
+                <a:shade val="78000"/>
+              </a:schemeClr>
+            </a:gs>
+          </a:gsLst>
+          <a:lin ang="5400000" scaled="0"/>
+        </a:gradFill>
+      </a:fillStyleLst>
+      <a:lnStyleLst>
+        <a:ln w="12700" cap="flat" cmpd="sng" algn="ctr">
+          <a:solidFill>
+            <a:schemeClr val="phClr"/>
+          </a:solidFill>
+          <a:prstDash val="solid"/>
+          <a:miter lim="800000"/>
+        </a:ln>
+        <a:ln w="19050" cap="flat" cmpd="sng" algn="ctr">
+          <a:solidFill>
+            <a:schemeClr val="phClr"/>
+          </a:solidFill>
+          <a:prstDash val="solid"/>
+          <a:miter lim="800000"/>
+        </a:ln>
+        <a:ln w="25400" cap="flat" cmpd="sng" algn="ctr">
+          <a:solidFill>
+            <a:schemeClr val="phClr"/>
+          </a:solidFill>
+          <a:prstDash val="solid"/>
+          <a:miter lim="800000"/>
+        </a:ln>
+      </a:lnStyleLst>
+      <a:effectStyleLst>
+        <a:effectStyle>
+          <a:effectLst/>
+        </a:effectStyle>
+        <a:effectStyle>
+          <a:effectLst/>
+        </a:effectStyle>
+        <a:effectStyle>
+          <a:effectLst>
+            <a:outerShdw blurRad="57150" dist="19050" dir="5400000" algn="ctr" rotWithShape="0">
+              <a:srgbClr val="000000">
+                <a:alpha val="63000"/>
+              </a:srgbClr>
+            </a:outerShdw>
+          </a:effectLst>
+        </a:effectStyle>
+      </a:effectStyleLst>
+      <a:bgFillStyleLst>
+        <a:solidFill>
+          <a:schemeClr val="phClr"/>
+        </a:solidFill>
+        <a:solidFill>
+          <a:schemeClr val="phClr">
+            <a:tint val="95000"/>
+            <a:satMod val="170000"/>
+          </a:schemeClr>
+        </a:solidFill>
+        <a:gradFill rotWithShape="1">
+          <a:gsLst>
+            <a:gs pos="0">
+              <a:schemeClr val="phClr">
+                <a:tint val="93000"/>
+                <a:satMod val="150000"/>
+                <a:shade val="98000"/>
+                <a:lumMod val="102000"/>
+              </a:schemeClr>
+            </a:gs>
+            <a:gs pos="50000">
+              <a:schemeClr val="phClr">
+                <a:tint val="98000"/>
+                <a:satMod val="130000"/>
+                <a:shade val="90000"/>
+                <a:lumMod val="103000"/>
+              </a:schemeClr>
+            </a:gs>
+            <a:gs pos="100000">
+              <a:schemeClr val="phClr">
+                <a:shade val="63000"/>
+                <a:satMod val="120000"/>
+              </a:schemeClr>
+            </a:gs>
+          </a:gsLst>
+          <a:lin ang="5400000" scaled="0"/>
+        </a:gradFill>
+      </a:bgFillStyleLst>
+    </a:fmtScheme>
+  </a:themeElements>
+  <a:objectDefaults>
+    <a:lnDef>
+      <a:spPr/>
+      <a:bodyPr/>
+      <a:lstStyle/>
+      <a:style>
+        <a:lnRef idx="2">
+          <a:schemeClr val="accent1"/>
+        </a:lnRef>
+        <a:fillRef idx="0">
+          <a:schemeClr val="accent1"/>
+        </a:fillRef>
+        <a:effectRef idx="1">
+          <a:schemeClr val="accent1"/>
+        </a:effectRef>
+        <a:fontRef idx="minor">
+          <a:schemeClr val="tx1"/>
+        </a:fontRef>
+      </a:style>
+    </a:lnDef>
+  </a:objectDefaults>
+  <a:extraClrSchemeLst/>
+  <a:extLst>
+    <a:ext uri="{05A4C25C-085E-4340-85A3-A5531E510DB2}">
+      <thm15:themeFamily xmlns:thm15="http://schemas.microsoft.com/office/thememl/2012/main" name="Office Theme" id="{2E142A2C-CD16-42D6-873A-C26D2A0506FA}" vid="{1BDDFF52-6CD6-40A5-AB3C-68EB2F1E4D0A}"/>
+    </a:ext>
+  </a:extLst>
+</a:theme>
 </file>
</xml_diff>